<commit_message>
Updated poster and added adtnl figures
</commit_message>
<xml_diff>
--- a/Poster and Presentation/Variance_Reduction_Poster.pptx
+++ b/Poster and Presentation/Variance_Reduction_Poster.pptx
@@ -3781,7 +3781,7 @@
         </p:nvSpPr>
         <p:spPr bwMode="auto">
           <a:xfrm>
-            <a:off x="6274940" y="228267"/>
+            <a:off x="6274940" y="-127333"/>
             <a:ext cx="28746580" cy="2539040"/>
           </a:xfrm>
           <a:prstGeom prst="rect">
@@ -3794,14 +3794,14 @@
           <a:effectLst/>
           <a:extLst>
             <a:ext uri="{909E8E84-426E-40dd-AFC4-6F175D3DCCD1}">
-              <a14:hiddenFill xmlns="" xmlns:a14="http://schemas.microsoft.com/office/drawing/2010/main">
+              <a14:hiddenFill xmlns:a14="http://schemas.microsoft.com/office/drawing/2010/main" xmlns="">
                 <a:solidFill>
                   <a:schemeClr val="accent1"/>
                 </a:solidFill>
               </a14:hiddenFill>
             </a:ext>
             <a:ext uri="{91240B29-F687-4f45-9708-019B960494DF}">
-              <a14:hiddenLine xmlns="" xmlns:a14="http://schemas.microsoft.com/office/drawing/2010/main" w="9525">
+              <a14:hiddenLine xmlns:a14="http://schemas.microsoft.com/office/drawing/2010/main" xmlns="" w="9525">
                 <a:solidFill>
                   <a:schemeClr val="tx1"/>
                 </a:solidFill>
@@ -3811,7 +3811,7 @@
               </a14:hiddenLine>
             </a:ext>
             <a:ext uri="{AF507438-7753-43e0-B8FC-AC1667EBCBE1}">
-              <a14:hiddenEffects xmlns="" xmlns:a14="http://schemas.microsoft.com/office/drawing/2010/main">
+              <a14:hiddenEffects xmlns:a14="http://schemas.microsoft.com/office/drawing/2010/main" xmlns="">
                 <a:effectLst>
                   <a:outerShdw dist="35921" dir="2700000" algn="ctr" rotWithShape="0">
                     <a:schemeClr val="bg2"/>
@@ -3921,7 +3921,7 @@
         </p:nvSpPr>
         <p:spPr bwMode="auto">
           <a:xfrm>
-            <a:off x="0" y="2199459"/>
+            <a:off x="0" y="2047059"/>
             <a:ext cx="41250977" cy="1714500"/>
           </a:xfrm>
           <a:prstGeom prst="rect">
@@ -3934,14 +3934,14 @@
           <a:effectLst/>
           <a:extLst>
             <a:ext uri="{909E8E84-426E-40dd-AFC4-6F175D3DCCD1}">
-              <a14:hiddenFill xmlns="" xmlns:a14="http://schemas.microsoft.com/office/drawing/2010/main">
+              <a14:hiddenFill xmlns:a14="http://schemas.microsoft.com/office/drawing/2010/main" xmlns="">
                 <a:solidFill>
                   <a:schemeClr val="accent1"/>
                 </a:solidFill>
               </a14:hiddenFill>
             </a:ext>
             <a:ext uri="{91240B29-F687-4f45-9708-019B960494DF}">
-              <a14:hiddenLine xmlns="" xmlns:a14="http://schemas.microsoft.com/office/drawing/2010/main" w="9525">
+              <a14:hiddenLine xmlns:a14="http://schemas.microsoft.com/office/drawing/2010/main" xmlns="" w="9525">
                 <a:solidFill>
                   <a:schemeClr val="tx1"/>
                 </a:solidFill>
@@ -3951,7 +3951,7 @@
               </a14:hiddenLine>
             </a:ext>
             <a:ext uri="{AF507438-7753-43e0-B8FC-AC1667EBCBE1}">
-              <a14:hiddenEffects xmlns="" xmlns:a14="http://schemas.microsoft.com/office/drawing/2010/main">
+              <a14:hiddenEffects xmlns:a14="http://schemas.microsoft.com/office/drawing/2010/main" xmlns="">
                 <a:effectLst>
                   <a:outerShdw dist="35921" dir="2700000" algn="ctr" rotWithShape="0">
                     <a:schemeClr val="bg2"/>
@@ -3976,7 +3976,34 @@
                 </a:solidFill>
                 <a:latin typeface="+mn-lt"/>
               </a:rPr>
-              <a:t>Scott Campbell</a:t>
+              <a:t>Scott Campbell, Gonzaga University</a:t>
+            </a:r>
+          </a:p>
+          <a:p>
+            <a:pPr algn="ctr" eaLnBrk="1" hangingPunct="1"/>
+            <a:r>
+              <a:rPr lang="en-US" sz="4000" i="1" kern="1200" dirty="0">
+                <a:solidFill>
+                  <a:schemeClr val="accent3">
+                    <a:lumMod val="20000"/>
+                    <a:lumOff val="80000"/>
+                  </a:schemeClr>
+                </a:solidFill>
+                <a:latin typeface="+mn-lt"/>
+              </a:rPr>
+              <a:t>Mentors:</a:t>
+            </a:r>
+            <a:r>
+              <a:rPr lang="en-US" sz="4000" kern="1200" dirty="0">
+                <a:solidFill>
+                  <a:schemeClr val="accent3">
+                    <a:lumMod val="20000"/>
+                    <a:lumOff val="80000"/>
+                  </a:schemeClr>
+                </a:solidFill>
+                <a:latin typeface="+mn-lt"/>
+              </a:rPr>
+              <a:t> Mathew Cleveland, Kendra Long, Ryan Wollaeger</a:t>
             </a:r>
             <a:endParaRPr lang="en-US" sz="4000" kern="1200" baseline="30000" dirty="0">
               <a:solidFill>
@@ -3987,32 +4014,6 @@
               </a:solidFill>
               <a:latin typeface="+mn-lt"/>
             </a:endParaRPr>
-          </a:p>
-          <a:p>
-            <a:pPr algn="ctr" eaLnBrk="1" hangingPunct="1"/>
-            <a:r>
-              <a:rPr lang="en-US" sz="4000" dirty="0">
-                <a:solidFill>
-                  <a:schemeClr val="accent3">
-                    <a:lumMod val="20000"/>
-                    <a:lumOff val="80000"/>
-                  </a:schemeClr>
-                </a:solidFill>
-              </a:rPr>
-              <a:t>XCP Summer Workshop, Gonzaga </a:t>
-            </a:r>
-            <a:r>
-              <a:rPr lang="en-US" sz="4000" kern="1200" dirty="0">
-                <a:solidFill>
-                  <a:schemeClr val="accent3">
-                    <a:lumMod val="20000"/>
-                    <a:lumOff val="80000"/>
-                  </a:schemeClr>
-                </a:solidFill>
-                <a:latin typeface="+mn-lt"/>
-              </a:rPr>
-              <a:t>University</a:t>
-            </a:r>
           </a:p>
         </p:txBody>
       </p:sp>
@@ -4316,7 +4317,7 @@
         </p:nvSpPr>
         <p:spPr>
           <a:xfrm>
-            <a:off x="27408010" y="4154059"/>
+            <a:off x="27371527" y="21685103"/>
             <a:ext cx="12798202" cy="666573"/>
           </a:xfrm>
           <a:prstGeom prst="rect">
@@ -4449,7 +4450,7 @@
                 <a:latin typeface="Arial"/>
                 <a:cs typeface="Arial"/>
               </a:rPr>
-              <a:t>Conclusion</a:t>
+              <a:t>Conclusions</a:t>
             </a:r>
           </a:p>
         </p:txBody>
@@ -6282,7 +6283,7 @@
         </p:nvSpPr>
         <p:spPr>
           <a:xfrm>
-            <a:off x="1185510" y="24325262"/>
+            <a:off x="1185510" y="24528462"/>
             <a:ext cx="12798202" cy="666573"/>
           </a:xfrm>
           <a:prstGeom prst="rect">
@@ -6434,7 +6435,7 @@
         </p:nvSpPr>
         <p:spPr>
           <a:xfrm>
-            <a:off x="1191101" y="25166621"/>
+            <a:off x="1191101" y="25369821"/>
             <a:ext cx="12798202" cy="4678204"/>
           </a:xfrm>
           <a:prstGeom prst="rect">
@@ -6503,7 +6504,7 @@
         </p:nvSpPr>
         <p:spPr>
           <a:xfrm>
-            <a:off x="14283216" y="14142148"/>
+            <a:off x="14283216" y="14294548"/>
             <a:ext cx="12798202" cy="666573"/>
           </a:xfrm>
           <a:prstGeom prst="rect">
@@ -7553,6 +7554,168 @@
           </p:sp>
         </mc:Fallback>
       </mc:AlternateContent>
+      <p:pic>
+        <p:nvPicPr>
+          <p:cNvPr id="3" name="Picture 2">
+            <a:extLst>
+              <a:ext uri="{FF2B5EF4-FFF2-40B4-BE49-F238E27FC236}">
+                <a16:creationId xmlns:a16="http://schemas.microsoft.com/office/drawing/2014/main" id="{C1B46CD6-BCEB-5E46-8E1B-930F7D63C49D}"/>
+              </a:ext>
+            </a:extLst>
+          </p:cNvPr>
+          <p:cNvPicPr>
+            <a:picLocks noChangeAspect="1"/>
+          </p:cNvPicPr>
+          <p:nvPr/>
+        </p:nvPicPr>
+        <p:blipFill>
+          <a:blip r:embed="rId6"/>
+          <a:stretch>
+            <a:fillRect/>
+          </a:stretch>
+        </p:blipFill>
+        <p:spPr>
+          <a:xfrm>
+            <a:off x="14341718" y="15248592"/>
+            <a:ext cx="8721482" cy="6588911"/>
+          </a:xfrm>
+          <a:prstGeom prst="rect">
+            <a:avLst/>
+          </a:prstGeom>
+        </p:spPr>
+      </p:pic>
+      <p:sp>
+        <p:nvSpPr>
+          <p:cNvPr id="4" name="TextBox 3">
+            <a:extLst>
+              <a:ext uri="{FF2B5EF4-FFF2-40B4-BE49-F238E27FC236}">
+                <a16:creationId xmlns:a16="http://schemas.microsoft.com/office/drawing/2014/main" id="{EFAA4296-C006-3D4C-AC52-0119C83E674D}"/>
+              </a:ext>
+            </a:extLst>
+          </p:cNvPr>
+          <p:cNvSpPr txBox="1"/>
+          <p:nvPr/>
+        </p:nvSpPr>
+        <p:spPr>
+          <a:xfrm>
+            <a:off x="23327054" y="15248592"/>
+            <a:ext cx="3744137" cy="6155531"/>
+          </a:xfrm>
+          <a:prstGeom prst="rect">
+            <a:avLst/>
+          </a:prstGeom>
+          <a:noFill/>
+        </p:spPr>
+        <p:txBody>
+          <a:bodyPr wrap="square" rtlCol="0">
+            <a:spAutoFit/>
+          </a:bodyPr>
+          <a:lstStyle/>
+          <a:p>
+            <a:r>
+              <a:rPr lang="en-US" sz="2400" i="1" dirty="0">
+                <a:latin typeface="Times" pitchFamily="2" charset="0"/>
+              </a:rPr>
+              <a:t>Figure 1: </a:t>
+            </a:r>
+          </a:p>
+          <a:p>
+            <a:endParaRPr lang="en-US" sz="1000" i="1" dirty="0">
+              <a:latin typeface="Times" pitchFamily="2" charset="0"/>
+            </a:endParaRPr>
+          </a:p>
+          <a:p>
+            <a:pPr algn="just"/>
+            <a:r>
+              <a:rPr lang="en-US" sz="2400" dirty="0">
+                <a:latin typeface="Times" pitchFamily="2" charset="0"/>
+              </a:rPr>
+              <a:t>A graph showing the figure of merits (FoM) of the regular tally method as well as the response function. A higher FoM corresponds to a method that provides less variance in a more efficient span of time. This figure shows that after approx. 50k particles, our method results in a significantly improved FoM compared to a regular tally. This provides a strong basis for the usefulness of our method.</a:t>
+            </a:r>
+          </a:p>
+        </p:txBody>
+      </p:sp>
+      <p:pic>
+        <p:nvPicPr>
+          <p:cNvPr id="16" name="Picture 15">
+            <a:extLst>
+              <a:ext uri="{FF2B5EF4-FFF2-40B4-BE49-F238E27FC236}">
+                <a16:creationId xmlns:a16="http://schemas.microsoft.com/office/drawing/2014/main" id="{E2CAD626-133C-4548-BA02-CDDBC0030142}"/>
+              </a:ext>
+            </a:extLst>
+          </p:cNvPr>
+          <p:cNvPicPr>
+            <a:picLocks noChangeAspect="1"/>
+          </p:cNvPicPr>
+          <p:nvPr/>
+        </p:nvPicPr>
+        <p:blipFill>
+          <a:blip r:embed="rId7"/>
+          <a:stretch>
+            <a:fillRect/>
+          </a:stretch>
+        </p:blipFill>
+        <p:spPr>
+          <a:xfrm>
+            <a:off x="14341718" y="22009128"/>
+            <a:ext cx="8721482" cy="6332236"/>
+          </a:xfrm>
+          <a:prstGeom prst="rect">
+            <a:avLst/>
+          </a:prstGeom>
+        </p:spPr>
+      </p:pic>
+      <p:sp>
+        <p:nvSpPr>
+          <p:cNvPr id="23" name="TextBox 22">
+            <a:extLst>
+              <a:ext uri="{FF2B5EF4-FFF2-40B4-BE49-F238E27FC236}">
+                <a16:creationId xmlns:a16="http://schemas.microsoft.com/office/drawing/2014/main" id="{D8ED94E9-5886-F447-B978-3F3074CADEF2}"/>
+              </a:ext>
+            </a:extLst>
+          </p:cNvPr>
+          <p:cNvSpPr txBox="1"/>
+          <p:nvPr/>
+        </p:nvSpPr>
+        <p:spPr>
+          <a:xfrm>
+            <a:off x="23327054" y="22106592"/>
+            <a:ext cx="3744137" cy="5047536"/>
+          </a:xfrm>
+          <a:prstGeom prst="rect">
+            <a:avLst/>
+          </a:prstGeom>
+          <a:noFill/>
+        </p:spPr>
+        <p:txBody>
+          <a:bodyPr wrap="square" rtlCol="0">
+            <a:spAutoFit/>
+          </a:bodyPr>
+          <a:lstStyle/>
+          <a:p>
+            <a:r>
+              <a:rPr lang="en-US" sz="2400" i="1" dirty="0">
+                <a:latin typeface="Times" pitchFamily="2" charset="0"/>
+              </a:rPr>
+              <a:t>Figure 2: </a:t>
+            </a:r>
+          </a:p>
+          <a:p>
+            <a:endParaRPr lang="en-US" sz="1000" i="1" dirty="0">
+              <a:latin typeface="Times" pitchFamily="2" charset="0"/>
+            </a:endParaRPr>
+          </a:p>
+          <a:p>
+            <a:pPr algn="just"/>
+            <a:r>
+              <a:rPr lang="en-US" sz="2400" dirty="0">
+                <a:latin typeface="Times" pitchFamily="2" charset="0"/>
+              </a:rPr>
+              <a:t>A graph showing the average values of the flux for a point source problem as well as the accompanying variance as a function of the number of particles used in the simulation. This shows that our method has far less variance for fewer simulated particles, which implies that it is a more reliable method under these conditions. </a:t>
+            </a:r>
+          </a:p>
+        </p:txBody>
+      </p:sp>
     </p:spTree>
     <p:extLst>
       <p:ext uri="{BB962C8B-B14F-4D97-AF65-F5344CB8AC3E}">

</xml_diff>

<commit_message>
Updated figures and presentation
</commit_message>
<xml_diff>
--- a/Poster and Presentation/Variance_Reduction_Poster.pptx
+++ b/Poster and Presentation/Variance_Reduction_Poster.pptx
@@ -208,7 +208,7 @@
           <a:p>
             <a:fld id="{C64D7CA3-7008-7349-8B55-6C7D24D241FF}" type="datetimeFigureOut">
               <a:rPr lang="en-US" smtClean="0"/>
-              <a:t>7/31/19</a:t>
+              <a:t>8/1/19</a:t>
             </a:fld>
             <a:endParaRPr lang="en-US"/>
           </a:p>
@@ -738,7 +738,7 @@
           <a:p>
             <a:fld id="{2FD8D12E-95C4-274C-8538-6990C022EAF5}" type="datetimeFigureOut">
               <a:rPr lang="en-US" smtClean="0"/>
-              <a:t>7/31/19</a:t>
+              <a:t>8/1/19</a:t>
             </a:fld>
             <a:endParaRPr lang="en-US"/>
           </a:p>
@@ -906,7 +906,7 @@
           <a:p>
             <a:fld id="{2FD8D12E-95C4-274C-8538-6990C022EAF5}" type="datetimeFigureOut">
               <a:rPr lang="en-US" smtClean="0"/>
-              <a:t>7/31/19</a:t>
+              <a:t>8/1/19</a:t>
             </a:fld>
             <a:endParaRPr lang="en-US"/>
           </a:p>
@@ -1084,7 +1084,7 @@
           <a:p>
             <a:fld id="{2FD8D12E-95C4-274C-8538-6990C022EAF5}" type="datetimeFigureOut">
               <a:rPr lang="en-US" smtClean="0"/>
-              <a:t>7/31/19</a:t>
+              <a:t>8/1/19</a:t>
             </a:fld>
             <a:endParaRPr lang="en-US"/>
           </a:p>
@@ -1252,7 +1252,7 @@
           <a:p>
             <a:fld id="{2FD8D12E-95C4-274C-8538-6990C022EAF5}" type="datetimeFigureOut">
               <a:rPr lang="en-US" smtClean="0"/>
-              <a:t>7/31/19</a:t>
+              <a:t>8/1/19</a:t>
             </a:fld>
             <a:endParaRPr lang="en-US"/>
           </a:p>
@@ -1497,7 +1497,7 @@
           <a:p>
             <a:fld id="{2FD8D12E-95C4-274C-8538-6990C022EAF5}" type="datetimeFigureOut">
               <a:rPr lang="en-US" smtClean="0"/>
-              <a:t>7/31/19</a:t>
+              <a:t>8/1/19</a:t>
             </a:fld>
             <a:endParaRPr lang="en-US"/>
           </a:p>
@@ -1782,7 +1782,7 @@
           <a:p>
             <a:fld id="{2FD8D12E-95C4-274C-8538-6990C022EAF5}" type="datetimeFigureOut">
               <a:rPr lang="en-US" smtClean="0"/>
-              <a:t>7/31/19</a:t>
+              <a:t>8/1/19</a:t>
             </a:fld>
             <a:endParaRPr lang="en-US"/>
           </a:p>
@@ -2201,7 +2201,7 @@
           <a:p>
             <a:fld id="{2FD8D12E-95C4-274C-8538-6990C022EAF5}" type="datetimeFigureOut">
               <a:rPr lang="en-US" smtClean="0"/>
-              <a:t>7/31/19</a:t>
+              <a:t>8/1/19</a:t>
             </a:fld>
             <a:endParaRPr lang="en-US"/>
           </a:p>
@@ -2318,7 +2318,7 @@
           <a:p>
             <a:fld id="{2FD8D12E-95C4-274C-8538-6990C022EAF5}" type="datetimeFigureOut">
               <a:rPr lang="en-US" smtClean="0"/>
-              <a:t>7/31/19</a:t>
+              <a:t>8/1/19</a:t>
             </a:fld>
             <a:endParaRPr lang="en-US"/>
           </a:p>
@@ -2413,7 +2413,7 @@
           <a:p>
             <a:fld id="{2FD8D12E-95C4-274C-8538-6990C022EAF5}" type="datetimeFigureOut">
               <a:rPr lang="en-US" smtClean="0"/>
-              <a:t>7/31/19</a:t>
+              <a:t>8/1/19</a:t>
             </a:fld>
             <a:endParaRPr lang="en-US"/>
           </a:p>
@@ -2688,7 +2688,7 @@
           <a:p>
             <a:fld id="{2FD8D12E-95C4-274C-8538-6990C022EAF5}" type="datetimeFigureOut">
               <a:rPr lang="en-US" smtClean="0"/>
-              <a:t>7/31/19</a:t>
+              <a:t>8/1/19</a:t>
             </a:fld>
             <a:endParaRPr lang="en-US"/>
           </a:p>
@@ -2940,7 +2940,7 @@
           <a:p>
             <a:fld id="{2FD8D12E-95C4-274C-8538-6990C022EAF5}" type="datetimeFigureOut">
               <a:rPr lang="en-US" smtClean="0"/>
-              <a:t>7/31/19</a:t>
+              <a:t>8/1/19</a:t>
             </a:fld>
             <a:endParaRPr lang="en-US"/>
           </a:p>
@@ -3151,7 +3151,7 @@
           <a:p>
             <a:fld id="{2FD8D12E-95C4-274C-8538-6990C022EAF5}" type="datetimeFigureOut">
               <a:rPr lang="en-US" smtClean="0"/>
-              <a:t>7/31/19</a:t>
+              <a:t>8/1/19</a:t>
             </a:fld>
             <a:endParaRPr lang="en-US"/>
           </a:p>
@@ -3794,14 +3794,14 @@
           <a:effectLst/>
           <a:extLst>
             <a:ext uri="{909E8E84-426E-40dd-AFC4-6F175D3DCCD1}">
-              <a14:hiddenFill xmlns:a14="http://schemas.microsoft.com/office/drawing/2010/main" xmlns="">
+              <a14:hiddenFill xmlns="" xmlns:a14="http://schemas.microsoft.com/office/drawing/2010/main">
                 <a:solidFill>
                   <a:schemeClr val="accent1"/>
                 </a:solidFill>
               </a14:hiddenFill>
             </a:ext>
             <a:ext uri="{91240B29-F687-4f45-9708-019B960494DF}">
-              <a14:hiddenLine xmlns:a14="http://schemas.microsoft.com/office/drawing/2010/main" xmlns="" w="9525">
+              <a14:hiddenLine xmlns="" xmlns:a14="http://schemas.microsoft.com/office/drawing/2010/main" w="9525">
                 <a:solidFill>
                   <a:schemeClr val="tx1"/>
                 </a:solidFill>
@@ -3811,7 +3811,7 @@
               </a14:hiddenLine>
             </a:ext>
             <a:ext uri="{AF507438-7753-43e0-B8FC-AC1667EBCBE1}">
-              <a14:hiddenEffects xmlns:a14="http://schemas.microsoft.com/office/drawing/2010/main" xmlns="">
+              <a14:hiddenEffects xmlns="" xmlns:a14="http://schemas.microsoft.com/office/drawing/2010/main">
                 <a:effectLst>
                   <a:outerShdw dist="35921" dir="2700000" algn="ctr" rotWithShape="0">
                     <a:schemeClr val="bg2"/>
@@ -3934,14 +3934,14 @@
           <a:effectLst/>
           <a:extLst>
             <a:ext uri="{909E8E84-426E-40dd-AFC4-6F175D3DCCD1}">
-              <a14:hiddenFill xmlns:a14="http://schemas.microsoft.com/office/drawing/2010/main" xmlns="">
+              <a14:hiddenFill xmlns="" xmlns:a14="http://schemas.microsoft.com/office/drawing/2010/main">
                 <a:solidFill>
                   <a:schemeClr val="accent1"/>
                 </a:solidFill>
               </a14:hiddenFill>
             </a:ext>
             <a:ext uri="{91240B29-F687-4f45-9708-019B960494DF}">
-              <a14:hiddenLine xmlns:a14="http://schemas.microsoft.com/office/drawing/2010/main" xmlns="" w="9525">
+              <a14:hiddenLine xmlns="" xmlns:a14="http://schemas.microsoft.com/office/drawing/2010/main" w="9525">
                 <a:solidFill>
                   <a:schemeClr val="tx1"/>
                 </a:solidFill>
@@ -3951,7 +3951,7 @@
               </a14:hiddenLine>
             </a:ext>
             <a:ext uri="{AF507438-7753-43e0-B8FC-AC1667EBCBE1}">
-              <a14:hiddenEffects xmlns:a14="http://schemas.microsoft.com/office/drawing/2010/main" xmlns="">
+              <a14:hiddenEffects xmlns="" xmlns:a14="http://schemas.microsoft.com/office/drawing/2010/main">
                 <a:effectLst>
                   <a:outerShdw dist="35921" dir="2700000" algn="ctr" rotWithShape="0">
                     <a:schemeClr val="bg2"/>
@@ -4025,7 +4025,7 @@
         </p:nvSpPr>
         <p:spPr>
           <a:xfrm>
-            <a:off x="1098424" y="4154059"/>
+            <a:off x="1098424" y="4197602"/>
             <a:ext cx="12798202" cy="666573"/>
           </a:xfrm>
           <a:prstGeom prst="rect">
@@ -4171,7 +4171,7 @@
         </p:nvSpPr>
         <p:spPr>
           <a:xfrm>
-            <a:off x="14283216" y="4154059"/>
+            <a:off x="14283216" y="4197602"/>
             <a:ext cx="12798202" cy="666573"/>
           </a:xfrm>
           <a:prstGeom prst="rect">
@@ -4455,8 +4455,8 @@
           </a:p>
         </p:txBody>
       </p:sp>
-      <mc:AlternateContent xmlns:mc="http://schemas.openxmlformats.org/markup-compatibility/2006" xmlns:a14="http://schemas.microsoft.com/office/drawing/2010/main">
-        <mc:Choice Requires="a14">
+      <mc:AlternateContent xmlns:mc="http://schemas.openxmlformats.org/markup-compatibility/2006">
+        <mc:Choice xmlns:a14="http://schemas.microsoft.com/office/drawing/2010/main" Requires="a14">
           <p:sp>
             <p:nvSpPr>
               <p:cNvPr id="20" name="Rectangle 19">
@@ -4471,7 +4471,7 @@
             </p:nvSpPr>
             <p:spPr>
               <a:xfrm>
-                <a:off x="1115324" y="5016574"/>
+                <a:off x="1115324" y="5234289"/>
                 <a:ext cx="12798202" cy="19051626"/>
               </a:xfrm>
               <a:prstGeom prst="rect">
@@ -6155,7 +6155,7 @@
               </a:p>
               <a:p>
                 <a:pPr algn="just"/>
-                <a:endParaRPr lang="en-US" sz="3200" b="1" dirty="0">
+                <a:endParaRPr lang="en-US" sz="1000" b="1" dirty="0">
                   <a:latin typeface="Times"/>
                 </a:endParaRPr>
               </a:p>
@@ -6224,7 +6224,7 @@
             </p:txBody>
           </p:sp>
         </mc:Choice>
-        <mc:Fallback xmlns="">
+        <mc:Fallback>
           <p:sp>
             <p:nvSpPr>
               <p:cNvPr id="20" name="Rectangle 19">
@@ -6241,7 +6241,7 @@
             </p:nvSpPr>
             <p:spPr>
               <a:xfrm>
-                <a:off x="1115324" y="5016574"/>
+                <a:off x="1115324" y="5234289"/>
                 <a:ext cx="12798202" cy="19051626"/>
               </a:xfrm>
               <a:prstGeom prst="rect">
@@ -6250,7 +6250,7 @@
               <a:blipFill>
                 <a:blip r:embed="rId4"/>
                 <a:stretch>
-                  <a:fillRect l="-1189" t="-400" r="-1090" b="-533"/>
+                  <a:fillRect l="-1189" t="-333" r="-1090"/>
                 </a:stretch>
               </a:blipFill>
             </p:spPr>
@@ -6283,7 +6283,7 @@
         </p:nvSpPr>
         <p:spPr>
           <a:xfrm>
-            <a:off x="1185510" y="24528462"/>
+            <a:off x="1185510" y="24117351"/>
             <a:ext cx="12798202" cy="666573"/>
           </a:xfrm>
           <a:prstGeom prst="rect">
@@ -6435,8 +6435,8 @@
         </p:nvSpPr>
         <p:spPr>
           <a:xfrm>
-            <a:off x="1191101" y="25369821"/>
-            <a:ext cx="12798202" cy="4678204"/>
+            <a:off x="1191101" y="25061484"/>
+            <a:ext cx="12798202" cy="5170646"/>
           </a:xfrm>
           <a:prstGeom prst="rect">
             <a:avLst/>
@@ -6454,21 +6454,7 @@
                 <a:latin typeface="Times"/>
                 <a:cs typeface="Times"/>
               </a:rPr>
-              <a:t>    The objective of this research project is to investigate the advantages and drawbacks of a response function VRM for IMC simulations using the open source IMC code </a:t>
-            </a:r>
-            <a:r>
-              <a:rPr lang="en-US" sz="3200" i="1" dirty="0">
-                <a:latin typeface="Times"/>
-                <a:cs typeface="Times"/>
-              </a:rPr>
-              <a:t>Branson</a:t>
-            </a:r>
-            <a:r>
-              <a:rPr lang="en-US" sz="3200" dirty="0">
-                <a:latin typeface="Times"/>
-                <a:cs typeface="Times"/>
-              </a:rPr>
-              <a:t> developed by Alex Long. The method is then to be applied to events such as multidimensional supernova transients, and comparing the simulation results to physical observations. </a:t>
+              <a:t>    The objective of this research is to investigate the advantages and drawbacks of a response function VRM for IMC simulations. Specifically, this method is analyzed for use in modeling events such as multidimensional supernova transients, and comparing the simulation results to physical observations which are computationally intensive due to their large scale and the multiple physics involved in the problem. </a:t>
             </a:r>
           </a:p>
           <a:p>
@@ -6504,7 +6490,7 @@
         </p:nvSpPr>
         <p:spPr>
           <a:xfrm>
-            <a:off x="14283216" y="14294548"/>
+            <a:off x="14283216" y="16402022"/>
             <a:ext cx="12798202" cy="666573"/>
           </a:xfrm>
           <a:prstGeom prst="rect">
@@ -6642,14 +6628,430 @@
           </a:p>
         </p:txBody>
       </p:sp>
+      <p:sp>
+        <p:nvSpPr>
+          <p:cNvPr id="18" name="Rectangle 17">
+            <a:extLst>
+              <a:ext uri="{FF2B5EF4-FFF2-40B4-BE49-F238E27FC236}">
+                <a16:creationId xmlns:a16="http://schemas.microsoft.com/office/drawing/2014/main" id="{5AB7C58A-81D4-454A-B609-FA15AED0E3EA}"/>
+              </a:ext>
+            </a:extLst>
+          </p:cNvPr>
+          <p:cNvSpPr/>
+          <p:nvPr/>
+        </p:nvSpPr>
+        <p:spPr>
+          <a:xfrm>
+            <a:off x="14272989" y="5022839"/>
+            <a:ext cx="12798202" cy="1077218"/>
+          </a:xfrm>
+          <a:prstGeom prst="rect">
+            <a:avLst/>
+          </a:prstGeom>
+        </p:spPr>
+        <p:txBody>
+          <a:bodyPr wrap="square">
+            <a:spAutoFit/>
+          </a:bodyPr>
+          <a:lstStyle/>
+          <a:p>
+            <a:pPr algn="just"/>
+            <a:r>
+              <a:rPr lang="en-US" sz="3200" dirty="0">
+                <a:latin typeface="Times"/>
+                <a:cs typeface="Times"/>
+              </a:rPr>
+              <a:t> The response function VRM was designed and implemented around a simplified point source problem of a single heated cell as show in Fig. 1:</a:t>
+            </a:r>
+          </a:p>
+        </p:txBody>
+      </p:sp>
+      <p:pic>
+        <p:nvPicPr>
+          <p:cNvPr id="3" name="Picture 2">
+            <a:extLst>
+              <a:ext uri="{FF2B5EF4-FFF2-40B4-BE49-F238E27FC236}">
+                <a16:creationId xmlns:a16="http://schemas.microsoft.com/office/drawing/2014/main" id="{C1B46CD6-BCEB-5E46-8E1B-930F7D63C49D}"/>
+              </a:ext>
+            </a:extLst>
+          </p:cNvPr>
+          <p:cNvPicPr>
+            <a:picLocks noChangeAspect="1"/>
+          </p:cNvPicPr>
+          <p:nvPr/>
+        </p:nvPicPr>
+        <p:blipFill>
+          <a:blip r:embed="rId5"/>
+          <a:stretch>
+            <a:fillRect/>
+          </a:stretch>
+        </p:blipFill>
+        <p:spPr>
+          <a:xfrm>
+            <a:off x="14341718" y="17479728"/>
+            <a:ext cx="8721482" cy="6588911"/>
+          </a:xfrm>
+          <a:prstGeom prst="rect">
+            <a:avLst/>
+          </a:prstGeom>
+        </p:spPr>
+      </p:pic>
+      <p:sp>
+        <p:nvSpPr>
+          <p:cNvPr id="4" name="TextBox 3">
+            <a:extLst>
+              <a:ext uri="{FF2B5EF4-FFF2-40B4-BE49-F238E27FC236}">
+                <a16:creationId xmlns:a16="http://schemas.microsoft.com/office/drawing/2014/main" id="{EFAA4296-C006-3D4C-AC52-0119C83E674D}"/>
+              </a:ext>
+            </a:extLst>
+          </p:cNvPr>
+          <p:cNvSpPr txBox="1"/>
+          <p:nvPr/>
+        </p:nvSpPr>
+        <p:spPr>
+          <a:xfrm>
+            <a:off x="23327054" y="17479728"/>
+            <a:ext cx="3744137" cy="6155531"/>
+          </a:xfrm>
+          <a:prstGeom prst="rect">
+            <a:avLst/>
+          </a:prstGeom>
+          <a:noFill/>
+        </p:spPr>
+        <p:txBody>
+          <a:bodyPr wrap="square" rtlCol="0">
+            <a:spAutoFit/>
+          </a:bodyPr>
+          <a:lstStyle/>
+          <a:p>
+            <a:r>
+              <a:rPr lang="en-US" sz="2400" i="1" dirty="0">
+                <a:latin typeface="Times" pitchFamily="2" charset="0"/>
+              </a:rPr>
+              <a:t>Figure 2: </a:t>
+            </a:r>
+          </a:p>
+          <a:p>
+            <a:endParaRPr lang="en-US" sz="1000" i="1" dirty="0">
+              <a:latin typeface="Times" pitchFamily="2" charset="0"/>
+            </a:endParaRPr>
+          </a:p>
+          <a:p>
+            <a:pPr algn="just"/>
+            <a:r>
+              <a:rPr lang="en-US" sz="2400" dirty="0">
+                <a:latin typeface="Times" pitchFamily="2" charset="0"/>
+              </a:rPr>
+              <a:t>A graph showing the figure of merits (FoM) of the regular tally method as well as the response function. A higher FoM corresponds to a method that provides less variance in a more efficient span of time. This figure shows that after approx. 50k particles, our method results in a significantly improved FoM compared to a regular tally. This provides a strong basis for the usefulness of our method.</a:t>
+            </a:r>
+          </a:p>
+        </p:txBody>
+      </p:sp>
+      <p:pic>
+        <p:nvPicPr>
+          <p:cNvPr id="16" name="Picture 15">
+            <a:extLst>
+              <a:ext uri="{FF2B5EF4-FFF2-40B4-BE49-F238E27FC236}">
+                <a16:creationId xmlns:a16="http://schemas.microsoft.com/office/drawing/2014/main" id="{E2CAD626-133C-4548-BA02-CDDBC0030142}"/>
+              </a:ext>
+            </a:extLst>
+          </p:cNvPr>
+          <p:cNvPicPr>
+            <a:picLocks noChangeAspect="1"/>
+          </p:cNvPicPr>
+          <p:nvPr/>
+        </p:nvPicPr>
+        <p:blipFill>
+          <a:blip r:embed="rId6"/>
+          <a:stretch>
+            <a:fillRect/>
+          </a:stretch>
+        </p:blipFill>
+        <p:spPr>
+          <a:xfrm>
+            <a:off x="14341718" y="24240264"/>
+            <a:ext cx="8721482" cy="6332236"/>
+          </a:xfrm>
+          <a:prstGeom prst="rect">
+            <a:avLst/>
+          </a:prstGeom>
+        </p:spPr>
+      </p:pic>
+      <p:sp>
+        <p:nvSpPr>
+          <p:cNvPr id="23" name="TextBox 22">
+            <a:extLst>
+              <a:ext uri="{FF2B5EF4-FFF2-40B4-BE49-F238E27FC236}">
+                <a16:creationId xmlns:a16="http://schemas.microsoft.com/office/drawing/2014/main" id="{D8ED94E9-5886-F447-B978-3F3074CADEF2}"/>
+              </a:ext>
+            </a:extLst>
+          </p:cNvPr>
+          <p:cNvSpPr txBox="1"/>
+          <p:nvPr/>
+        </p:nvSpPr>
+        <p:spPr>
+          <a:xfrm>
+            <a:off x="23327054" y="24337728"/>
+            <a:ext cx="3744137" cy="5047536"/>
+          </a:xfrm>
+          <a:prstGeom prst="rect">
+            <a:avLst/>
+          </a:prstGeom>
+          <a:noFill/>
+        </p:spPr>
+        <p:txBody>
+          <a:bodyPr wrap="square" rtlCol="0">
+            <a:spAutoFit/>
+          </a:bodyPr>
+          <a:lstStyle/>
+          <a:p>
+            <a:r>
+              <a:rPr lang="en-US" sz="2400" i="1" dirty="0">
+                <a:latin typeface="Times" pitchFamily="2" charset="0"/>
+              </a:rPr>
+              <a:t>Figure 3: </a:t>
+            </a:r>
+          </a:p>
+          <a:p>
+            <a:endParaRPr lang="en-US" sz="1000" i="1" dirty="0">
+              <a:latin typeface="Times" pitchFamily="2" charset="0"/>
+            </a:endParaRPr>
+          </a:p>
+          <a:p>
+            <a:pPr algn="just"/>
+            <a:r>
+              <a:rPr lang="en-US" sz="2400" dirty="0">
+                <a:latin typeface="Times" pitchFamily="2" charset="0"/>
+              </a:rPr>
+              <a:t>A graph showing the average values of the flux for a point source problem as well as the accompanying variance as a function of the number of particles used in the simulation. This shows that our method has far less variance for fewer simulated particles, which implies that it is a more reliable method under these conditions. </a:t>
+            </a:r>
+          </a:p>
+        </p:txBody>
+      </p:sp>
       <mc:AlternateContent xmlns:mc="http://schemas.openxmlformats.org/markup-compatibility/2006" xmlns:a14="http://schemas.microsoft.com/office/drawing/2010/main">
         <mc:Choice Requires="a14">
           <p:sp>
             <p:nvSpPr>
-              <p:cNvPr id="18" name="Rectangle 17">
+              <p:cNvPr id="31" name="TextBox 30">
                 <a:extLst>
                   <a:ext uri="{FF2B5EF4-FFF2-40B4-BE49-F238E27FC236}">
-                    <a16:creationId xmlns:a16="http://schemas.microsoft.com/office/drawing/2014/main" id="{5AB7C58A-81D4-454A-B609-FA15AED0E3EA}"/>
+                    <a16:creationId xmlns:a16="http://schemas.microsoft.com/office/drawing/2014/main" id="{026F371B-C1A4-CC4F-9F41-8F62133D4C1A}"/>
+                  </a:ext>
+                </a:extLst>
+              </p:cNvPr>
+              <p:cNvSpPr txBox="1"/>
+              <p:nvPr/>
+            </p:nvSpPr>
+            <p:spPr>
+              <a:xfrm>
+                <a:off x="19949952" y="6142145"/>
+                <a:ext cx="7121239" cy="5063759"/>
+              </a:xfrm>
+              <a:prstGeom prst="rect">
+                <a:avLst/>
+              </a:prstGeom>
+              <a:noFill/>
+            </p:spPr>
+            <p:txBody>
+              <a:bodyPr wrap="square" rtlCol="0">
+                <a:spAutoFit/>
+              </a:bodyPr>
+              <a:lstStyle/>
+              <a:p>
+                <a:r>
+                  <a:rPr lang="en-US" sz="2400" i="1" dirty="0">
+                    <a:latin typeface="Times" pitchFamily="2" charset="0"/>
+                  </a:rPr>
+                  <a:t>Figure 1: </a:t>
+                </a:r>
+              </a:p>
+              <a:p>
+                <a:endParaRPr lang="en-US" sz="1000" i="1" dirty="0">
+                  <a:latin typeface="Times" pitchFamily="2" charset="0"/>
+                </a:endParaRPr>
+              </a:p>
+              <a:p>
+                <a:pPr algn="just"/>
+                <a:r>
+                  <a:rPr lang="en-US" sz="2400" dirty="0">
+                    <a:latin typeface="Times" pitchFamily="2" charset="0"/>
+                  </a:rPr>
+                  <a:t>A simplified visualization of the response function method. Particles are traced from the surface of the tally (blue ring) ‘towards’ the source (purple square) until they exit the mesh. As the particle moves, an adjusted opacity, </a:t>
+                </a:r>
+                <a14:m>
+                  <m:oMath xmlns:m="http://schemas.openxmlformats.org/officeDocument/2006/math">
+                    <m:sSub>
+                      <m:sSubPr>
+                        <m:ctrlPr>
+                          <a:rPr lang="en-US" sz="2400" b="0" i="1" smtClean="0">
+                            <a:latin typeface="Cambria Math" panose="02040503050406030204" pitchFamily="18" charset="0"/>
+                          </a:rPr>
+                        </m:ctrlPr>
+                      </m:sSubPr>
+                      <m:e>
+                        <m:r>
+                          <a:rPr lang="en-US" sz="2400" b="0" i="1" smtClean="0">
+                            <a:latin typeface="Cambria Math" panose="02040503050406030204" pitchFamily="18" charset="0"/>
+                          </a:rPr>
+                          <m:t>𝜎</m:t>
+                        </m:r>
+                      </m:e>
+                      <m:sub>
+                        <m:r>
+                          <a:rPr lang="en-US" sz="2400" b="0" i="1" smtClean="0">
+                            <a:latin typeface="Cambria Math" panose="02040503050406030204" pitchFamily="18" charset="0"/>
+                          </a:rPr>
+                          <m:t>𝑟</m:t>
+                        </m:r>
+                      </m:sub>
+                    </m:sSub>
+                  </m:oMath>
+                </a14:m>
+                <a:r>
+                  <a:rPr lang="en-US" sz="2400" dirty="0">
+                    <a:latin typeface="Times" pitchFamily="2" charset="0"/>
+                  </a:rPr>
+                  <a:t>, is calculated based on how far the particle has traveled from its origin on the tally surface, as well as the </a:t>
+                </a:r>
+                <a14:m>
+                  <m:oMath xmlns:m="http://schemas.openxmlformats.org/officeDocument/2006/math">
+                    <m:sSub>
+                      <m:sSubPr>
+                        <m:ctrlPr>
+                          <a:rPr lang="en-US" sz="2400" i="1">
+                            <a:latin typeface="Cambria Math" panose="02040503050406030204" pitchFamily="18" charset="0"/>
+                          </a:rPr>
+                        </m:ctrlPr>
+                      </m:sSubPr>
+                      <m:e>
+                        <m:r>
+                          <a:rPr lang="en-US" sz="2400" i="1">
+                            <a:latin typeface="Cambria Math" panose="02040503050406030204" pitchFamily="18" charset="0"/>
+                          </a:rPr>
+                          <m:t>𝜎</m:t>
+                        </m:r>
+                      </m:e>
+                      <m:sub>
+                        <m:r>
+                          <a:rPr lang="en-US" sz="2400" b="0" i="1" smtClean="0">
+                            <a:latin typeface="Cambria Math" panose="02040503050406030204" pitchFamily="18" charset="0"/>
+                          </a:rPr>
+                          <m:t>𝑎</m:t>
+                        </m:r>
+                        <m:r>
+                          <a:rPr lang="en-US" sz="2400" b="0" i="1" smtClean="0">
+                            <a:latin typeface="Cambria Math" panose="02040503050406030204" pitchFamily="18" charset="0"/>
+                          </a:rPr>
+                          <m:t>,   </m:t>
+                        </m:r>
+                        <m:r>
+                          <a:rPr lang="en-US" sz="2400" b="0" i="1" smtClean="0">
+                            <a:latin typeface="Cambria Math" panose="02040503050406030204" pitchFamily="18" charset="0"/>
+                          </a:rPr>
+                          <m:t>𝑐𝑒𝑙𝑙</m:t>
+                        </m:r>
+                      </m:sub>
+                    </m:sSub>
+                  </m:oMath>
+                </a14:m>
+                <a:r>
+                  <a:rPr lang="en-US" sz="2400" dirty="0">
+                    <a:latin typeface="Times" pitchFamily="2" charset="0"/>
+                  </a:rPr>
+                  <a:t> values of the cells that it has passed through. A darker shade of red corresponds to a higher </a:t>
+                </a:r>
+                <a14:m>
+                  <m:oMath xmlns:m="http://schemas.openxmlformats.org/officeDocument/2006/math">
+                    <m:sSub>
+                      <m:sSubPr>
+                        <m:ctrlPr>
+                          <a:rPr lang="en-US" sz="2400" i="1">
+                            <a:latin typeface="Cambria Math" panose="02040503050406030204" pitchFamily="18" charset="0"/>
+                          </a:rPr>
+                        </m:ctrlPr>
+                      </m:sSubPr>
+                      <m:e>
+                        <m:r>
+                          <a:rPr lang="en-US" sz="2400" i="1">
+                            <a:latin typeface="Cambria Math" panose="02040503050406030204" pitchFamily="18" charset="0"/>
+                          </a:rPr>
+                          <m:t>𝜎</m:t>
+                        </m:r>
+                      </m:e>
+                      <m:sub>
+                        <m:r>
+                          <a:rPr lang="en-US" sz="2400" i="1">
+                            <a:latin typeface="Cambria Math" panose="02040503050406030204" pitchFamily="18" charset="0"/>
+                          </a:rPr>
+                          <m:t>𝑟</m:t>
+                        </m:r>
+                      </m:sub>
+                    </m:sSub>
+                  </m:oMath>
+                </a14:m>
+                <a:r>
+                  <a:rPr lang="en-US" sz="2400" dirty="0">
+                    <a:latin typeface="Times" pitchFamily="2" charset="0"/>
+                  </a:rPr>
+                  <a:t> value – a less likely chance that a particle will ‘make it’ to the tally. These values are then used to calculate an effective contribution to the tally based on the cell the particle being transported is in.</a:t>
+                </a:r>
+              </a:p>
+            </p:txBody>
+          </p:sp>
+        </mc:Choice>
+        <mc:Fallback xmlns="">
+          <p:sp>
+            <p:nvSpPr>
+              <p:cNvPr id="31" name="TextBox 30">
+                <a:extLst>
+                  <a:ext uri="{FF2B5EF4-FFF2-40B4-BE49-F238E27FC236}">
+                    <a16:creationId xmlns:a16="http://schemas.microsoft.com/office/drawing/2014/main" id="{026F371B-C1A4-CC4F-9F41-8F62133D4C1A}"/>
+                  </a:ext>
+                </a:extLst>
+              </p:cNvPr>
+              <p:cNvSpPr txBox="1">
+                <a:spLocks noRot="1" noChangeAspect="1" noMove="1" noResize="1" noEditPoints="1" noAdjustHandles="1" noChangeArrowheads="1" noChangeShapeType="1" noTextEdit="1"/>
+              </p:cNvSpPr>
+              <p:nvPr/>
+            </p:nvSpPr>
+            <p:spPr>
+              <a:xfrm>
+                <a:off x="19949952" y="6142145"/>
+                <a:ext cx="7121239" cy="5063759"/>
+              </a:xfrm>
+              <a:prstGeom prst="rect">
+                <a:avLst/>
+              </a:prstGeom>
+              <a:blipFill>
+                <a:blip r:embed="rId7"/>
+                <a:stretch>
+                  <a:fillRect l="-1246" t="-1003" r="-1068" b="-1504"/>
+                </a:stretch>
+              </a:blipFill>
+            </p:spPr>
+            <p:txBody>
+              <a:bodyPr/>
+              <a:lstStyle/>
+              <a:p>
+                <a:r>
+                  <a:rPr lang="en-US">
+                    <a:noFill/>
+                  </a:rPr>
+                  <a:t> </a:t>
+                </a:r>
+              </a:p>
+            </p:txBody>
+          </p:sp>
+        </mc:Fallback>
+      </mc:AlternateContent>
+      <mc:AlternateContent xmlns:mc="http://schemas.openxmlformats.org/markup-compatibility/2006" xmlns:a14="http://schemas.microsoft.com/office/drawing/2010/main">
+        <mc:Choice Requires="a14">
+          <p:sp>
+            <p:nvSpPr>
+              <p:cNvPr id="34" name="Rectangle 33">
+                <a:extLst>
+                  <a:ext uri="{FF2B5EF4-FFF2-40B4-BE49-F238E27FC236}">
+                    <a16:creationId xmlns:a16="http://schemas.microsoft.com/office/drawing/2014/main" id="{4A40473E-0DA2-5047-8BF1-55210294587F}"/>
                   </a:ext>
                 </a:extLst>
               </p:cNvPr>
@@ -6658,8 +7060,8 @@
             </p:nvSpPr>
             <p:spPr>
               <a:xfrm>
-                <a:off x="14272989" y="5022839"/>
-                <a:ext cx="12798202" cy="8865697"/>
+                <a:off x="14267734" y="11576032"/>
+                <a:ext cx="12798202" cy="4313297"/>
               </a:xfrm>
               <a:prstGeom prst="rect">
                 <a:avLst/>
@@ -6677,7 +7079,7 @@
                     <a:latin typeface="Times"/>
                     <a:cs typeface="Times"/>
                   </a:rPr>
-                  <a:t> The response function VRM is implemented as follows:</a:t>
+                  <a:t> After calculating the backwards approximation as in Fig. 1, the forward problem (the true simulation) is implemented as follows:</a:t>
                 </a:r>
               </a:p>
               <a:p>
@@ -6687,532 +7089,7 @@
                     <a:latin typeface="Times"/>
                     <a:cs typeface="Times"/>
                   </a:rPr>
-                  <a:t>    1. The backwards approximation is calculated by tracing particles through</a:t>
-                </a:r>
-              </a:p>
-              <a:p>
-                <a:pPr algn="just"/>
-                <a:r>
-                  <a:rPr lang="en-US" sz="3200" dirty="0">
-                    <a:latin typeface="Times"/>
-                    <a:cs typeface="Times"/>
-                  </a:rPr>
-                  <a:t>        the mesh starting at the tally surface towards the source </a:t>
-                </a:r>
-              </a:p>
-              <a:p>
-                <a:pPr algn="just"/>
-                <a:r>
-                  <a:rPr lang="en-US" sz="3200" dirty="0">
-                    <a:latin typeface="Times"/>
-                    <a:cs typeface="Times"/>
-                  </a:rPr>
-                  <a:t>    2. As the particle passes through each cell in the mesh, accumulate:</a:t>
-                </a:r>
-              </a:p>
-              <a:p>
-                <a:pPr algn="just"/>
-                <a:r>
-                  <a:rPr lang="en-US" sz="3200" dirty="0">
-                    <a:latin typeface="Times"/>
-                    <a:cs typeface="Times"/>
-                  </a:rPr>
-                  <a:t>          • The total distance the particle has traveled, </a:t>
-                </a:r>
-                <a14:m>
-                  <m:oMath xmlns:m="http://schemas.openxmlformats.org/officeDocument/2006/math">
-                    <m:sSub>
-                      <m:sSubPr>
-                        <m:ctrlPr>
-                          <a:rPr lang="en-US" sz="3200" b="0" i="1" smtClean="0">
-                            <a:latin typeface="Cambria Math" panose="02040503050406030204" pitchFamily="18" charset="0"/>
-                            <a:cs typeface="Times"/>
-                          </a:rPr>
-                        </m:ctrlPr>
-                      </m:sSubPr>
-                      <m:e>
-                        <m:r>
-                          <a:rPr lang="en-US" sz="3200" b="0" i="1" smtClean="0">
-                            <a:latin typeface="Cambria Math" panose="02040503050406030204" pitchFamily="18" charset="0"/>
-                            <a:cs typeface="Times"/>
-                          </a:rPr>
-                          <m:t>𝑑</m:t>
-                        </m:r>
-                      </m:e>
-                      <m:sub>
-                        <m:r>
-                          <a:rPr lang="en-US" sz="3200" b="0" i="1" smtClean="0">
-                            <a:latin typeface="Cambria Math" panose="02040503050406030204" pitchFamily="18" charset="0"/>
-                            <a:cs typeface="Times"/>
-                          </a:rPr>
-                          <m:t>𝑡𝑜𝑡𝑎𝑙</m:t>
-                        </m:r>
-                        <m:r>
-                          <a:rPr lang="en-US" sz="3200" b="0" i="1" smtClean="0">
-                            <a:latin typeface="Cambria Math" panose="02040503050406030204" pitchFamily="18" charset="0"/>
-                            <a:cs typeface="Times"/>
-                          </a:rPr>
-                          <m:t>,</m:t>
-                        </m:r>
-                        <m:r>
-                          <a:rPr lang="en-US" sz="3200" b="0" i="1" smtClean="0">
-                            <a:latin typeface="Cambria Math" panose="02040503050406030204" pitchFamily="18" charset="0"/>
-                            <a:cs typeface="Times"/>
-                          </a:rPr>
-                          <m:t>𝑝𝑎𝑟𝑡𝑖𝑐𝑙𝑒</m:t>
-                        </m:r>
-                      </m:sub>
-                    </m:sSub>
-                  </m:oMath>
-                </a14:m>
-                <a:endParaRPr lang="en-US" sz="3200" dirty="0">
-                  <a:latin typeface="Times"/>
-                  <a:cs typeface="Times"/>
-                </a:endParaRPr>
-              </a:p>
-              <a:p>
-                <a:pPr algn="just"/>
-                <a:r>
-                  <a:rPr lang="en-US" sz="3200" dirty="0">
-                    <a:latin typeface="Times"/>
-                    <a:cs typeface="Times"/>
-                  </a:rPr>
-                  <a:t>          • The product of </a:t>
-                </a:r>
-                <a14:m>
-                  <m:oMath xmlns:m="http://schemas.openxmlformats.org/officeDocument/2006/math">
-                    <m:r>
-                      <a:rPr lang="en-US" sz="3200" b="0" i="1" smtClean="0">
-                        <a:latin typeface="Cambria Math" panose="02040503050406030204" pitchFamily="18" charset="0"/>
-                        <a:cs typeface="Times"/>
-                      </a:rPr>
-                      <m:t>𝜎</m:t>
-                    </m:r>
-                    <m:sSub>
-                      <m:sSubPr>
-                        <m:ctrlPr>
-                          <a:rPr lang="en-US" sz="3200" b="0" i="1" smtClean="0">
-                            <a:latin typeface="Cambria Math" panose="02040503050406030204" pitchFamily="18" charset="0"/>
-                            <a:cs typeface="Times"/>
-                          </a:rPr>
-                        </m:ctrlPr>
-                      </m:sSubPr>
-                      <m:e>
-                        <m:r>
-                          <a:rPr lang="en-US" sz="3200" b="0" i="1" smtClean="0">
-                            <a:latin typeface="Cambria Math" panose="02040503050406030204" pitchFamily="18" charset="0"/>
-                            <a:cs typeface="Times"/>
-                          </a:rPr>
-                          <m:t>𝑑</m:t>
-                        </m:r>
-                      </m:e>
-                      <m:sub>
-                        <m:r>
-                          <a:rPr lang="en-US" sz="3200" b="0" i="1" smtClean="0">
-                            <a:latin typeface="Cambria Math" panose="02040503050406030204" pitchFamily="18" charset="0"/>
-                            <a:cs typeface="Times"/>
-                          </a:rPr>
-                          <m:t>𝑝𝑎𝑟𝑡𝑖𝑐𝑙𝑒</m:t>
-                        </m:r>
-                        <m:r>
-                          <a:rPr lang="en-US" sz="3200" b="0" i="1" smtClean="0">
-                            <a:latin typeface="Cambria Math" panose="02040503050406030204" pitchFamily="18" charset="0"/>
-                            <a:cs typeface="Times"/>
-                          </a:rPr>
-                          <m:t>,   </m:t>
-                        </m:r>
-                        <m:r>
-                          <a:rPr lang="en-US" sz="3200" b="0" i="1" smtClean="0">
-                            <a:latin typeface="Cambria Math" panose="02040503050406030204" pitchFamily="18" charset="0"/>
-                            <a:cs typeface="Times"/>
-                          </a:rPr>
-                          <m:t>𝑛</m:t>
-                        </m:r>
-                      </m:sub>
-                    </m:sSub>
-                  </m:oMath>
-                </a14:m>
-                <a:r>
-                  <a:rPr lang="en-US" sz="3200" dirty="0">
-                    <a:latin typeface="Times"/>
-                    <a:cs typeface="Times"/>
-                  </a:rPr>
-                  <a:t> for the distance the particle goes in cell </a:t>
-                </a:r>
-                <a:r>
-                  <a:rPr lang="en-US" sz="3200" i="1" dirty="0">
-                    <a:latin typeface="Times"/>
-                    <a:cs typeface="Times"/>
-                  </a:rPr>
-                  <a:t>n</a:t>
-                </a:r>
-                <a:endParaRPr lang="en-US" sz="3200" dirty="0">
-                  <a:latin typeface="Times"/>
-                  <a:cs typeface="Times"/>
-                </a:endParaRPr>
-              </a:p>
-              <a:p>
-                <a:pPr algn="just"/>
-                <a:r>
-                  <a:rPr lang="en-US" sz="3200" dirty="0">
-                    <a:latin typeface="Times"/>
-                    <a:cs typeface="Times"/>
-                  </a:rPr>
-                  <a:t>          • The total distance of all particle through the cell, </a:t>
-                </a:r>
-                <a14:m>
-                  <m:oMath xmlns:m="http://schemas.openxmlformats.org/officeDocument/2006/math">
-                    <m:sSub>
-                      <m:sSubPr>
-                        <m:ctrlPr>
-                          <a:rPr lang="en-US" sz="3200" b="0" i="1" smtClean="0">
-                            <a:latin typeface="Cambria Math" panose="02040503050406030204" pitchFamily="18" charset="0"/>
-                            <a:cs typeface="Times"/>
-                          </a:rPr>
-                        </m:ctrlPr>
-                      </m:sSubPr>
-                      <m:e>
-                        <m:r>
-                          <a:rPr lang="en-US" sz="3200" b="0" i="1" smtClean="0">
-                            <a:latin typeface="Cambria Math" panose="02040503050406030204" pitchFamily="18" charset="0"/>
-                            <a:cs typeface="Times"/>
-                          </a:rPr>
-                          <m:t>𝑑</m:t>
-                        </m:r>
-                      </m:e>
-                      <m:sub>
-                        <m:r>
-                          <a:rPr lang="en-US" sz="3200" b="0" i="1" smtClean="0">
-                            <a:latin typeface="Cambria Math" panose="02040503050406030204" pitchFamily="18" charset="0"/>
-                            <a:cs typeface="Times"/>
-                          </a:rPr>
-                          <m:t>𝑡𝑜𝑡𝑎𝑙</m:t>
-                        </m:r>
-                        <m:r>
-                          <a:rPr lang="en-US" sz="3200" b="0" i="1" smtClean="0">
-                            <a:latin typeface="Cambria Math" panose="02040503050406030204" pitchFamily="18" charset="0"/>
-                            <a:cs typeface="Times"/>
-                          </a:rPr>
-                          <m:t>,   </m:t>
-                        </m:r>
-                        <m:r>
-                          <a:rPr lang="en-US" sz="3200" b="0" i="1" smtClean="0">
-                            <a:latin typeface="Cambria Math" panose="02040503050406030204" pitchFamily="18" charset="0"/>
-                            <a:cs typeface="Times"/>
-                          </a:rPr>
-                          <m:t>𝑐𝑒𝑙𝑙</m:t>
-                        </m:r>
-                      </m:sub>
-                    </m:sSub>
-                  </m:oMath>
-                </a14:m>
-                <a:endParaRPr lang="en-US" sz="3200" dirty="0">
-                  <a:latin typeface="Times"/>
-                  <a:cs typeface="Times"/>
-                </a:endParaRPr>
-              </a:p>
-              <a:p>
-                <a:pPr algn="just"/>
-                <a:r>
-                  <a:rPr lang="en-US" sz="3200" dirty="0">
-                    <a:latin typeface="Times"/>
-                    <a:cs typeface="Times"/>
-                  </a:rPr>
-                  <a:t>          • The total </a:t>
-                </a:r>
-                <a14:m>
-                  <m:oMath xmlns:m="http://schemas.openxmlformats.org/officeDocument/2006/math">
-                    <m:r>
-                      <a:rPr lang="en-US" sz="3200" b="0" i="1" smtClean="0">
-                        <a:latin typeface="Cambria Math" panose="02040503050406030204" pitchFamily="18" charset="0"/>
-                        <a:cs typeface="Times"/>
-                      </a:rPr>
-                      <m:t>𝜎</m:t>
-                    </m:r>
-                    <m:r>
-                      <a:rPr lang="en-US" sz="3200" b="0" i="1" smtClean="0">
-                        <a:latin typeface="Cambria Math" panose="02040503050406030204" pitchFamily="18" charset="0"/>
-                        <a:cs typeface="Times"/>
-                      </a:rPr>
-                      <m:t>𝑑</m:t>
-                    </m:r>
-                  </m:oMath>
-                </a14:m>
-                <a:r>
-                  <a:rPr lang="en-US" sz="3200" dirty="0">
-                    <a:latin typeface="Times"/>
-                    <a:cs typeface="Times"/>
-                  </a:rPr>
-                  <a:t> for each cell, </a:t>
-                </a:r>
-                <a14:m>
-                  <m:oMath xmlns:m="http://schemas.openxmlformats.org/officeDocument/2006/math">
-                    <m:r>
-                      <a:rPr lang="en-US" sz="3200" b="0" i="1" smtClean="0">
-                        <a:latin typeface="Cambria Math" panose="02040503050406030204" pitchFamily="18" charset="0"/>
-                        <a:cs typeface="Times"/>
-                      </a:rPr>
-                      <m:t>𝜎</m:t>
-                    </m:r>
-                    <m:sSub>
-                      <m:sSubPr>
-                        <m:ctrlPr>
-                          <a:rPr lang="en-US" sz="3200" b="0" i="1" smtClean="0">
-                            <a:latin typeface="Cambria Math" panose="02040503050406030204" pitchFamily="18" charset="0"/>
-                            <a:cs typeface="Times"/>
-                          </a:rPr>
-                        </m:ctrlPr>
-                      </m:sSubPr>
-                      <m:e>
-                        <m:r>
-                          <a:rPr lang="en-US" sz="3200" b="0" i="1" smtClean="0">
-                            <a:latin typeface="Cambria Math" panose="02040503050406030204" pitchFamily="18" charset="0"/>
-                            <a:cs typeface="Times"/>
-                          </a:rPr>
-                          <m:t>𝑑</m:t>
-                        </m:r>
-                      </m:e>
-                      <m:sub>
-                        <m:r>
-                          <a:rPr lang="en-US" sz="3200" b="0" i="1" smtClean="0">
-                            <a:latin typeface="Cambria Math" panose="02040503050406030204" pitchFamily="18" charset="0"/>
-                            <a:cs typeface="Times"/>
-                          </a:rPr>
-                          <m:t>𝑛</m:t>
-                        </m:r>
-                      </m:sub>
-                    </m:sSub>
-                    <m:r>
-                      <a:rPr lang="en-US" sz="3200" b="0" i="1" smtClean="0">
-                        <a:latin typeface="Cambria Math" panose="02040503050406030204" pitchFamily="18" charset="0"/>
-                        <a:cs typeface="Times"/>
-                      </a:rPr>
-                      <m:t>=</m:t>
-                    </m:r>
-                    <m:f>
-                      <m:fPr>
-                        <m:ctrlPr>
-                          <a:rPr lang="en-US" sz="3200" b="0" i="1" smtClean="0">
-                            <a:latin typeface="Cambria Math" panose="02040503050406030204" pitchFamily="18" charset="0"/>
-                            <a:cs typeface="Times"/>
-                          </a:rPr>
-                        </m:ctrlPr>
-                      </m:fPr>
-                      <m:num>
-                        <m:r>
-                          <a:rPr lang="en-US" sz="3200" b="0" i="1" smtClean="0">
-                            <a:latin typeface="Cambria Math" panose="02040503050406030204" pitchFamily="18" charset="0"/>
-                            <a:cs typeface="Times"/>
-                          </a:rPr>
-                          <m:t>𝜎</m:t>
-                        </m:r>
-                        <m:sSub>
-                          <m:sSubPr>
-                            <m:ctrlPr>
-                              <a:rPr lang="en-US" sz="3200" b="0" i="1" smtClean="0">
-                                <a:latin typeface="Cambria Math" panose="02040503050406030204" pitchFamily="18" charset="0"/>
-                                <a:cs typeface="Times"/>
-                              </a:rPr>
-                            </m:ctrlPr>
-                          </m:sSubPr>
-                          <m:e>
-                            <m:r>
-                              <a:rPr lang="en-US" sz="3200" b="0" i="1" smtClean="0">
-                                <a:latin typeface="Cambria Math" panose="02040503050406030204" pitchFamily="18" charset="0"/>
-                                <a:cs typeface="Times"/>
-                              </a:rPr>
-                              <m:t>𝑑</m:t>
-                            </m:r>
-                          </m:e>
-                          <m:sub>
-                            <m:r>
-                              <a:rPr lang="en-US" sz="3200" b="0" i="1" smtClean="0">
-                                <a:latin typeface="Cambria Math" panose="02040503050406030204" pitchFamily="18" charset="0"/>
-                                <a:cs typeface="Times"/>
-                              </a:rPr>
-                              <m:t>𝑝𝑎𝑟𝑡𝑖𝑐𝑙𝑒</m:t>
-                            </m:r>
-                            <m:r>
-                              <a:rPr lang="en-US" sz="3200" b="0" i="1" smtClean="0">
-                                <a:latin typeface="Cambria Math" panose="02040503050406030204" pitchFamily="18" charset="0"/>
-                                <a:cs typeface="Times"/>
-                              </a:rPr>
-                              <m:t>,   </m:t>
-                            </m:r>
-                            <m:r>
-                              <a:rPr lang="en-US" sz="3200" b="0" i="1" smtClean="0">
-                                <a:latin typeface="Cambria Math" panose="02040503050406030204" pitchFamily="18" charset="0"/>
-                                <a:cs typeface="Times"/>
-                              </a:rPr>
-                              <m:t>𝑛</m:t>
-                            </m:r>
-                          </m:sub>
-                        </m:sSub>
-                      </m:num>
-                      <m:den>
-                        <m:sSub>
-                          <m:sSubPr>
-                            <m:ctrlPr>
-                              <a:rPr lang="en-US" sz="3200" b="0" i="1" smtClean="0">
-                                <a:latin typeface="Cambria Math" panose="02040503050406030204" pitchFamily="18" charset="0"/>
-                                <a:cs typeface="Times"/>
-                              </a:rPr>
-                            </m:ctrlPr>
-                          </m:sSubPr>
-                          <m:e>
-                            <m:r>
-                              <a:rPr lang="en-US" sz="3200" b="0" i="1" smtClean="0">
-                                <a:latin typeface="Cambria Math" panose="02040503050406030204" pitchFamily="18" charset="0"/>
-                                <a:cs typeface="Times"/>
-                              </a:rPr>
-                              <m:t>𝑑</m:t>
-                            </m:r>
-                          </m:e>
-                          <m:sub>
-                            <m:r>
-                              <a:rPr lang="en-US" sz="3200" b="0" i="1" smtClean="0">
-                                <a:latin typeface="Cambria Math" panose="02040503050406030204" pitchFamily="18" charset="0"/>
-                                <a:cs typeface="Times"/>
-                              </a:rPr>
-                              <m:t>𝑡𝑜𝑡𝑎𝑙</m:t>
-                            </m:r>
-                            <m:r>
-                              <a:rPr lang="en-US" sz="3200" b="0" i="1" smtClean="0">
-                                <a:latin typeface="Cambria Math" panose="02040503050406030204" pitchFamily="18" charset="0"/>
-                                <a:cs typeface="Times"/>
-                              </a:rPr>
-                              <m:t>,  </m:t>
-                            </m:r>
-                            <m:r>
-                              <a:rPr lang="en-US" sz="3200" b="0" i="1" smtClean="0">
-                                <a:latin typeface="Cambria Math" panose="02040503050406030204" pitchFamily="18" charset="0"/>
-                                <a:cs typeface="Times"/>
-                              </a:rPr>
-                              <m:t>𝑝𝑎𝑟𝑡𝑖𝑐𝑙𝑒</m:t>
-                            </m:r>
-                          </m:sub>
-                        </m:sSub>
-                      </m:den>
-                    </m:f>
-                    <m:r>
-                      <a:rPr lang="en-US" sz="3200" b="0" i="1" smtClean="0">
-                        <a:latin typeface="Cambria Math" panose="02040503050406030204" pitchFamily="18" charset="0"/>
-                        <a:cs typeface="Times"/>
-                      </a:rPr>
-                      <m:t> </m:t>
-                    </m:r>
-                    <m:sSub>
-                      <m:sSubPr>
-                        <m:ctrlPr>
-                          <a:rPr lang="en-US" sz="3200" b="0" i="1" smtClean="0">
-                            <a:latin typeface="Cambria Math" panose="02040503050406030204" pitchFamily="18" charset="0"/>
-                            <a:cs typeface="Times"/>
-                          </a:rPr>
-                        </m:ctrlPr>
-                      </m:sSubPr>
-                      <m:e>
-                        <m:r>
-                          <a:rPr lang="en-US" sz="3200" b="0" i="1" smtClean="0">
-                            <a:latin typeface="Cambria Math" panose="02040503050406030204" pitchFamily="18" charset="0"/>
-                            <a:cs typeface="Times"/>
-                          </a:rPr>
-                          <m:t>𝑑</m:t>
-                        </m:r>
-                      </m:e>
-                      <m:sub>
-                        <m:r>
-                          <a:rPr lang="en-US" sz="3200" b="0" i="1" smtClean="0">
-                            <a:latin typeface="Cambria Math" panose="02040503050406030204" pitchFamily="18" charset="0"/>
-                            <a:cs typeface="Times"/>
-                          </a:rPr>
-                          <m:t>𝑐𝑒𝑙𝑙</m:t>
-                        </m:r>
-                      </m:sub>
-                    </m:sSub>
-                  </m:oMath>
-                </a14:m>
-                <a:r>
-                  <a:rPr lang="en-US" sz="3200" dirty="0">
-                    <a:latin typeface="Times"/>
-                    <a:cs typeface="Times"/>
-                  </a:rPr>
-                  <a:t> for the distance, </a:t>
-                </a:r>
-              </a:p>
-              <a:p>
-                <a:pPr algn="just"/>
-                <a:r>
-                  <a:rPr lang="en-US" sz="3200" dirty="0">
-                    <a:latin typeface="Times"/>
-                    <a:cs typeface="Times"/>
-                  </a:rPr>
-                  <a:t>             </a:t>
-                </a:r>
-                <a14:m>
-                  <m:oMath xmlns:m="http://schemas.openxmlformats.org/officeDocument/2006/math">
-                    <m:sSub>
-                      <m:sSubPr>
-                        <m:ctrlPr>
-                          <a:rPr lang="en-US" sz="3200" i="1">
-                            <a:latin typeface="Cambria Math" panose="02040503050406030204" pitchFamily="18" charset="0"/>
-                            <a:cs typeface="Times"/>
-                          </a:rPr>
-                        </m:ctrlPr>
-                      </m:sSubPr>
-                      <m:e>
-                        <m:r>
-                          <a:rPr lang="en-US" sz="3200" i="1">
-                            <a:latin typeface="Cambria Math" panose="02040503050406030204" pitchFamily="18" charset="0"/>
-                            <a:cs typeface="Times"/>
-                          </a:rPr>
-                          <m:t>𝑑</m:t>
-                        </m:r>
-                      </m:e>
-                      <m:sub>
-                        <m:r>
-                          <a:rPr lang="en-US" sz="3200" i="1">
-                            <a:latin typeface="Cambria Math" panose="02040503050406030204" pitchFamily="18" charset="0"/>
-                            <a:cs typeface="Times"/>
-                          </a:rPr>
-                          <m:t>𝑐𝑒𝑙𝑙</m:t>
-                        </m:r>
-                      </m:sub>
-                    </m:sSub>
-                  </m:oMath>
-                </a14:m>
-                <a:r>
-                  <a:rPr lang="en-US" sz="3200" dirty="0">
-                    <a:latin typeface="Times"/>
-                    <a:cs typeface="Times"/>
-                  </a:rPr>
-                  <a:t>, the particle goes through the cell</a:t>
-                </a:r>
-              </a:p>
-              <a:p>
-                <a:pPr algn="just"/>
-                <a:endParaRPr lang="en-US" sz="1000" dirty="0">
-                  <a:latin typeface="Times"/>
-                  <a:cs typeface="Times"/>
-                </a:endParaRPr>
-              </a:p>
-              <a:p>
-                <a:pPr algn="just"/>
-                <a:r>
-                  <a:rPr lang="en-US" sz="3200" dirty="0">
-                    <a:latin typeface="Times"/>
-                    <a:cs typeface="Times"/>
-                  </a:rPr>
-                  <a:t>The forward transport is implemented as follows:</a:t>
-                </a:r>
-              </a:p>
-              <a:p>
-                <a:pPr algn="just"/>
-                <a:r>
-                  <a:rPr lang="en-US" sz="3200" dirty="0">
-                    <a:latin typeface="Times"/>
-                    <a:cs typeface="Times"/>
-                  </a:rPr>
-                  <a:t>    1. Upon creation, a contribution is added to the tally accd. To</a:t>
+                  <a:t> 1. Upon creation, a contribution is added to the tally accd. To</a:t>
                 </a:r>
               </a:p>
               <a:p>
@@ -7226,7 +7103,7 @@
                       <m:eqArr>
                         <m:eqArrPr>
                           <m:ctrlPr>
-                            <a:rPr lang="en-US" sz="3200" b="0" i="1" smtClean="0">
+                            <a:rPr lang="en-US" sz="3200" i="1">
                               <a:latin typeface="Cambria Math" panose="02040503050406030204" pitchFamily="18" charset="0"/>
                               <a:cs typeface="Times"/>
                             </a:rPr>
@@ -7234,14 +7111,14 @@
                         </m:eqArrPr>
                         <m:e>
                           <m:r>
-                            <a:rPr lang="en-US" sz="3200" b="0" i="1" smtClean="0">
+                            <a:rPr lang="en-US" sz="3200" i="1">
                               <a:latin typeface="Cambria Math" panose="02040503050406030204" pitchFamily="18" charset="0"/>
                               <a:cs typeface="Times"/>
                             </a:rPr>
                             <m:t>𝐶𝑜𝑛𝑡𝑟𝑖𝑏𝑢𝑡𝑖𝑜𝑛</m:t>
                           </m:r>
                           <m:r>
-                            <a:rPr lang="en-US" sz="3200" b="0" i="1" smtClean="0">
+                            <a:rPr lang="en-US" sz="3200" i="1">
                               <a:latin typeface="Cambria Math" panose="02040503050406030204" pitchFamily="18" charset="0"/>
                               <a:cs typeface="Times"/>
                             </a:rPr>
@@ -7250,7 +7127,7 @@
                           <m:sSub>
                             <m:sSubPr>
                               <m:ctrlPr>
-                                <a:rPr lang="en-US" sz="3200" b="0" i="1" smtClean="0">
+                                <a:rPr lang="en-US" sz="3200" i="1">
                                   <a:latin typeface="Cambria Math" panose="02040503050406030204" pitchFamily="18" charset="0"/>
                                   <a:cs typeface="Times"/>
                                 </a:rPr>
@@ -7258,7 +7135,7 @@
                             </m:sSubPr>
                             <m:e>
                               <m:r>
-                                <a:rPr lang="en-US" sz="3200" b="0" i="1" smtClean="0">
+                                <a:rPr lang="en-US" sz="3200" i="1">
                                   <a:latin typeface="Cambria Math" panose="02040503050406030204" pitchFamily="18" charset="0"/>
                                   <a:cs typeface="Times"/>
                                 </a:rPr>
@@ -7267,7 +7144,7 @@
                             </m:e>
                             <m:sub>
                               <m:r>
-                                <a:rPr lang="en-US" sz="3200" b="0" i="1" smtClean="0">
+                                <a:rPr lang="en-US" sz="3200" i="1">
                                   <a:latin typeface="Cambria Math" panose="02040503050406030204" pitchFamily="18" charset="0"/>
                                   <a:cs typeface="Times"/>
                                 </a:rPr>
@@ -7276,7 +7153,7 @@
                             </m:sub>
                           </m:sSub>
                           <m:r>
-                            <a:rPr lang="en-US" sz="3200" b="0" i="1" smtClean="0">
+                            <a:rPr lang="en-US" sz="3200" i="1">
                               <a:latin typeface="Cambria Math" panose="02040503050406030204" pitchFamily="18" charset="0"/>
                               <a:cs typeface="Times"/>
                             </a:rPr>
@@ -7285,7 +7162,7 @@
                           <m:sSup>
                             <m:sSupPr>
                               <m:ctrlPr>
-                                <a:rPr lang="en-US" sz="3200" b="0" i="1" smtClean="0">
+                                <a:rPr lang="en-US" sz="3200" i="1">
                                   <a:latin typeface="Cambria Math" panose="02040503050406030204" pitchFamily="18" charset="0"/>
                                   <a:cs typeface="Times"/>
                                 </a:rPr>
@@ -7293,7 +7170,7 @@
                             </m:sSupPr>
                             <m:e>
                               <m:r>
-                                <a:rPr lang="en-US" sz="3200" b="0" i="1" smtClean="0">
+                                <a:rPr lang="en-US" sz="3200" i="1">
                                   <a:latin typeface="Cambria Math" panose="02040503050406030204" pitchFamily="18" charset="0"/>
                                   <a:cs typeface="Times"/>
                                 </a:rPr>
@@ -7302,7 +7179,7 @@
                             </m:e>
                             <m:sup>
                               <m:r>
-                                <a:rPr lang="en-US" sz="3200" b="0" i="1" smtClean="0">
+                                <a:rPr lang="en-US" sz="3200" i="1">
                                   <a:latin typeface="Cambria Math" panose="02040503050406030204" pitchFamily="18" charset="0"/>
                                   <a:cs typeface="Times"/>
                                 </a:rPr>
@@ -7311,7 +7188,7 @@
                               <m:d>
                                 <m:dPr>
                                   <m:ctrlPr>
-                                    <a:rPr lang="en-US" sz="3200" b="0" i="1" smtClean="0">
+                                    <a:rPr lang="en-US" sz="3200" i="1">
                                       <a:latin typeface="Cambria Math" panose="02040503050406030204" pitchFamily="18" charset="0"/>
                                       <a:cs typeface="Times"/>
                                     </a:rPr>
@@ -7321,7 +7198,7 @@
                                   <m:sSub>
                                     <m:sSubPr>
                                       <m:ctrlPr>
-                                        <a:rPr lang="en-US" sz="3200" b="0" i="1" smtClean="0">
+                                        <a:rPr lang="en-US" sz="3200" i="1">
                                           <a:latin typeface="Cambria Math" panose="02040503050406030204" pitchFamily="18" charset="0"/>
                                           <a:cs typeface="Times"/>
                                         </a:rPr>
@@ -7329,7 +7206,7 @@
                                     </m:sSubPr>
                                     <m:e>
                                       <m:r>
-                                        <a:rPr lang="en-US" sz="3200" b="0" i="1" smtClean="0">
+                                        <a:rPr lang="en-US" sz="3200" i="1">
                                           <a:latin typeface="Cambria Math" panose="02040503050406030204" pitchFamily="18" charset="0"/>
                                           <a:cs typeface="Times"/>
                                         </a:rPr>
@@ -7338,7 +7215,7 @@
                                     </m:e>
                                     <m:sub>
                                       <m:r>
-                                        <a:rPr lang="en-US" sz="3200" b="0" i="1" smtClean="0">
+                                        <a:rPr lang="en-US" sz="3200" i="1">
                                           <a:latin typeface="Cambria Math" panose="02040503050406030204" pitchFamily="18" charset="0"/>
                                           <a:cs typeface="Times"/>
                                         </a:rPr>
@@ -7347,7 +7224,7 @@
                                     </m:sub>
                                   </m:sSub>
                                   <m:r>
-                                    <a:rPr lang="en-US" sz="3200" b="0" i="1" smtClean="0">
+                                    <a:rPr lang="en-US" sz="3200" i="1">
                                       <a:latin typeface="Cambria Math" panose="02040503050406030204" pitchFamily="18" charset="0"/>
                                       <a:cs typeface="Times"/>
                                     </a:rPr>
@@ -7356,7 +7233,7 @@
                                   <m:f>
                                     <m:fPr>
                                       <m:ctrlPr>
-                                        <a:rPr lang="en-US" sz="3200" b="0" i="1" smtClean="0">
+                                        <a:rPr lang="en-US" sz="3200" i="1">
                                           <a:latin typeface="Cambria Math" panose="02040503050406030204" pitchFamily="18" charset="0"/>
                                           <a:cs typeface="Times"/>
                                         </a:rPr>
@@ -7364,7 +7241,7 @@
                                     </m:fPr>
                                     <m:num>
                                       <m:r>
-                                        <a:rPr lang="en-US" sz="3200" b="0" i="1" smtClean="0">
+                                        <a:rPr lang="en-US" sz="3200" i="1">
                                           <a:latin typeface="Cambria Math" panose="02040503050406030204" pitchFamily="18" charset="0"/>
                                           <a:cs typeface="Times"/>
                                         </a:rPr>
@@ -7373,7 +7250,7 @@
                                     </m:num>
                                     <m:den>
                                       <m:r>
-                                        <a:rPr lang="en-US" sz="3200" b="0" i="1" smtClean="0">
+                                        <a:rPr lang="en-US" sz="3200" i="1">
                                           <a:latin typeface="Cambria Math" panose="02040503050406030204" pitchFamily="18" charset="0"/>
                                           <a:cs typeface="Times"/>
                                         </a:rPr>
@@ -7383,14 +7260,14 @@
                                         <m:rPr>
                                           <m:sty m:val="p"/>
                                         </m:rPr>
-                                        <a:rPr lang="en-US" sz="3200" b="0" i="0" smtClean="0">
+                                        <a:rPr lang="en-US" sz="3200">
                                           <a:latin typeface="Cambria Math" panose="02040503050406030204" pitchFamily="18" charset="0"/>
                                           <a:cs typeface="Times"/>
                                         </a:rPr>
                                         <m:t>Δ</m:t>
                                       </m:r>
                                       <m:r>
-                                        <a:rPr lang="en-US" sz="3200" b="0" i="1" smtClean="0">
+                                        <a:rPr lang="en-US" sz="3200" i="1">
                                           <a:latin typeface="Cambria Math" panose="02040503050406030204" pitchFamily="18" charset="0"/>
                                           <a:cs typeface="Times"/>
                                         </a:rPr>
@@ -7403,7 +7280,7 @@
                               <m:sSub>
                                 <m:sSubPr>
                                   <m:ctrlPr>
-                                    <a:rPr lang="en-US" sz="3200" b="0" i="1" smtClean="0">
+                                    <a:rPr lang="en-US" sz="3200" i="1">
                                       <a:latin typeface="Cambria Math" panose="02040503050406030204" pitchFamily="18" charset="0"/>
                                       <a:cs typeface="Times"/>
                                     </a:rPr>
@@ -7411,7 +7288,7 @@
                                 </m:sSubPr>
                                 <m:e>
                                   <m:r>
-                                    <a:rPr lang="en-US" sz="3200" b="0" i="1" smtClean="0">
+                                    <a:rPr lang="en-US" sz="3200" i="1">
                                       <a:latin typeface="Cambria Math" panose="02040503050406030204" pitchFamily="18" charset="0"/>
                                       <a:cs typeface="Times"/>
                                     </a:rPr>
@@ -7420,7 +7297,7 @@
                                 </m:e>
                                 <m:sub>
                                   <m:r>
-                                    <a:rPr lang="en-US" sz="3200" b="0" i="1" smtClean="0">
+                                    <a:rPr lang="en-US" sz="3200" i="1">
                                       <a:latin typeface="Cambria Math" panose="02040503050406030204" pitchFamily="18" charset="0"/>
                                       <a:cs typeface="Times"/>
                                     </a:rPr>
@@ -7431,7 +7308,7 @@
                             </m:sup>
                           </m:sSup>
                           <m:r>
-                            <a:rPr lang="en-US" sz="3200" b="0" i="1" smtClean="0">
+                            <a:rPr lang="en-US" sz="3200" i="1">
                               <a:latin typeface="Cambria Math" panose="02040503050406030204" pitchFamily="18" charset="0"/>
                               <a:cs typeface="Times"/>
                             </a:rPr>
@@ -7440,7 +7317,7 @@
                           <m:d>
                             <m:dPr>
                               <m:ctrlPr>
-                                <a:rPr lang="en-US" sz="3200" b="0" i="1" smtClean="0">
+                                <a:rPr lang="en-US" sz="3200" i="1">
                                   <a:latin typeface="Cambria Math" panose="02040503050406030204" pitchFamily="18" charset="0"/>
                                   <a:cs typeface="Times"/>
                                 </a:rPr>
@@ -7448,7 +7325,7 @@
                             </m:dPr>
                             <m:e>
                               <m:r>
-                                <a:rPr lang="en-US" sz="3200" b="0" i="1" smtClean="0">
+                                <a:rPr lang="en-US" sz="3200" i="1">
                                   <a:latin typeface="Cambria Math" panose="02040503050406030204" pitchFamily="18" charset="0"/>
                                   <a:cs typeface="Times"/>
                                 </a:rPr>
@@ -7512,10 +7389,10 @@
         <mc:Fallback xmlns="">
           <p:sp>
             <p:nvSpPr>
-              <p:cNvPr id="18" name="Rectangle 17">
+              <p:cNvPr id="34" name="Rectangle 33">
                 <a:extLst>
                   <a:ext uri="{FF2B5EF4-FFF2-40B4-BE49-F238E27FC236}">
-                    <a16:creationId xmlns:a16="http://schemas.microsoft.com/office/drawing/2014/main" id="{5AB7C58A-81D4-454A-B609-FA15AED0E3EA}"/>
+                    <a16:creationId xmlns:a16="http://schemas.microsoft.com/office/drawing/2014/main" id="{4A40473E-0DA2-5047-8BF1-55210294587F}"/>
                   </a:ext>
                 </a:extLst>
               </p:cNvPr>
@@ -7526,16 +7403,16 @@
             </p:nvSpPr>
             <p:spPr>
               <a:xfrm>
-                <a:off x="14272989" y="5022839"/>
-                <a:ext cx="12798202" cy="8865697"/>
+                <a:off x="14267734" y="11576032"/>
+                <a:ext cx="12798202" cy="4313297"/>
               </a:xfrm>
               <a:prstGeom prst="rect">
                 <a:avLst/>
               </a:prstGeom>
               <a:blipFill>
-                <a:blip r:embed="rId5"/>
+                <a:blip r:embed="rId9"/>
                 <a:stretch>
-                  <a:fillRect l="-1189" t="-714" r="-694" b="-1286"/>
+                  <a:fillRect l="-1090" t="-1466" r="-1189" b="-3812"/>
                 </a:stretch>
               </a:blipFill>
             </p:spPr>
@@ -7556,10 +7433,10 @@
       </mc:AlternateContent>
       <p:pic>
         <p:nvPicPr>
-          <p:cNvPr id="3" name="Picture 2">
+          <p:cNvPr id="13" name="Picture 12">
             <a:extLst>
               <a:ext uri="{FF2B5EF4-FFF2-40B4-BE49-F238E27FC236}">
-                <a16:creationId xmlns:a16="http://schemas.microsoft.com/office/drawing/2014/main" id="{C1B46CD6-BCEB-5E46-8E1B-930F7D63C49D}"/>
+                <a16:creationId xmlns:a16="http://schemas.microsoft.com/office/drawing/2014/main" id="{8FFE326E-1A0A-1943-987C-E159F8AAD1AB}"/>
               </a:ext>
             </a:extLst>
           </p:cNvPr>
@@ -7569,78 +7446,301 @@
           <p:nvPr/>
         </p:nvPicPr>
         <p:blipFill>
-          <a:blip r:embed="rId6"/>
+          <a:blip r:embed="rId10"/>
           <a:stretch>
             <a:fillRect/>
           </a:stretch>
         </p:blipFill>
         <p:spPr>
           <a:xfrm>
-            <a:off x="14341718" y="15248592"/>
-            <a:ext cx="8721482" cy="6588911"/>
+            <a:off x="27424910" y="4197602"/>
+            <a:ext cx="7596610" cy="6836949"/>
           </a:xfrm>
           <a:prstGeom prst="rect">
             <a:avLst/>
           </a:prstGeom>
         </p:spPr>
       </p:pic>
-      <p:sp>
-        <p:nvSpPr>
-          <p:cNvPr id="4" name="TextBox 3">
+      <mc:AlternateContent xmlns:mc="http://schemas.openxmlformats.org/markup-compatibility/2006">
+        <mc:Choice xmlns:a14="http://schemas.microsoft.com/office/drawing/2010/main" Requires="a14">
+          <p:sp>
+            <p:nvSpPr>
+              <p:cNvPr id="30" name="TextBox 29">
+                <a:extLst>
+                  <a:ext uri="{FF2B5EF4-FFF2-40B4-BE49-F238E27FC236}">
+                    <a16:creationId xmlns:a16="http://schemas.microsoft.com/office/drawing/2014/main" id="{03EB4E38-B560-3B45-8FF4-E6E431DB0D35}"/>
+                  </a:ext>
+                </a:extLst>
+              </p:cNvPr>
+              <p:cNvSpPr txBox="1"/>
+              <p:nvPr/>
+            </p:nvSpPr>
+            <p:spPr>
+              <a:xfrm>
+                <a:off x="35030825" y="4545596"/>
+                <a:ext cx="5138904" cy="6155531"/>
+              </a:xfrm>
+              <a:prstGeom prst="rect">
+                <a:avLst/>
+              </a:prstGeom>
+              <a:noFill/>
+            </p:spPr>
+            <p:txBody>
+              <a:bodyPr wrap="square" rtlCol="0">
+                <a:spAutoFit/>
+              </a:bodyPr>
+              <a:lstStyle/>
+              <a:p>
+                <a:r>
+                  <a:rPr lang="en-US" sz="2400" i="1" dirty="0">
+                    <a:latin typeface="Times" pitchFamily="2" charset="0"/>
+                  </a:rPr>
+                  <a:t>Figure 4: </a:t>
+                </a:r>
+              </a:p>
+              <a:p>
+                <a:endParaRPr lang="en-US" sz="1000" i="1" dirty="0">
+                  <a:latin typeface="Times" pitchFamily="2" charset="0"/>
+                </a:endParaRPr>
+              </a:p>
+              <a:p>
+                <a:pPr algn="just"/>
+                <a:r>
+                  <a:rPr lang="en-US" sz="2400" dirty="0">
+                    <a:latin typeface="Times" pitchFamily="2" charset="0"/>
+                  </a:rPr>
+                  <a:t>A plot of the geometrically simplified supernova problem showing the true </a:t>
+                </a:r>
+                <a14:m>
+                  <m:oMath xmlns:m="http://schemas.openxmlformats.org/officeDocument/2006/math">
+                    <m:sSub>
+                      <m:sSubPr>
+                        <m:ctrlPr>
+                          <a:rPr lang="en-US" sz="2400" b="0" i="1" smtClean="0">
+                            <a:latin typeface="Cambria Math" panose="02040503050406030204" pitchFamily="18" charset="0"/>
+                          </a:rPr>
+                        </m:ctrlPr>
+                      </m:sSubPr>
+                      <m:e>
+                        <m:r>
+                          <a:rPr lang="en-US" sz="2400" b="0" i="1" smtClean="0">
+                            <a:latin typeface="Cambria Math" panose="02040503050406030204" pitchFamily="18" charset="0"/>
+                          </a:rPr>
+                          <m:t>𝜎</m:t>
+                        </m:r>
+                      </m:e>
+                      <m:sub>
+                        <m:r>
+                          <a:rPr lang="en-US" sz="2400" b="0" i="1" smtClean="0">
+                            <a:latin typeface="Cambria Math" panose="02040503050406030204" pitchFamily="18" charset="0"/>
+                          </a:rPr>
+                          <m:t>𝑎</m:t>
+                        </m:r>
+                      </m:sub>
+                    </m:sSub>
+                  </m:oMath>
+                </a14:m>
+                <a:r>
+                  <a:rPr lang="en-US" sz="2400" dirty="0">
+                    <a:latin typeface="Times" pitchFamily="2" charset="0"/>
+                  </a:rPr>
+                  <a:t> value of the problem (left-hand side) as well as the </a:t>
+                </a:r>
+                <a14:m>
+                  <m:oMath xmlns:m="http://schemas.openxmlformats.org/officeDocument/2006/math">
+                    <m:sSub>
+                      <m:sSubPr>
+                        <m:ctrlPr>
+                          <a:rPr lang="en-US" sz="2400" b="0" i="1" smtClean="0">
+                            <a:latin typeface="Cambria Math" panose="02040503050406030204" pitchFamily="18" charset="0"/>
+                          </a:rPr>
+                        </m:ctrlPr>
+                      </m:sSubPr>
+                      <m:e>
+                        <m:r>
+                          <a:rPr lang="en-US" sz="2400" b="0" i="1" smtClean="0">
+                            <a:latin typeface="Cambria Math" panose="02040503050406030204" pitchFamily="18" charset="0"/>
+                          </a:rPr>
+                          <m:t>𝜎</m:t>
+                        </m:r>
+                      </m:e>
+                      <m:sub>
+                        <m:r>
+                          <a:rPr lang="en-US" sz="2400" b="0" i="1" smtClean="0">
+                            <a:latin typeface="Cambria Math" panose="02040503050406030204" pitchFamily="18" charset="0"/>
+                          </a:rPr>
+                          <m:t>𝑟</m:t>
+                        </m:r>
+                      </m:sub>
+                    </m:sSub>
+                  </m:oMath>
+                </a14:m>
+                <a:r>
+                  <a:rPr lang="en-US" sz="2400" dirty="0">
+                    <a:latin typeface="Times" pitchFamily="2" charset="0"/>
+                  </a:rPr>
+                  <a:t> values generated by the response function method (right-hand side). The smearing artifacts show a limitation of the direction-independent </a:t>
+                </a:r>
+                <a14:m>
+                  <m:oMath xmlns:m="http://schemas.openxmlformats.org/officeDocument/2006/math">
+                    <m:sSub>
+                      <m:sSubPr>
+                        <m:ctrlPr>
+                          <a:rPr lang="en-US" sz="2400" i="1">
+                            <a:latin typeface="Cambria Math" panose="02040503050406030204" pitchFamily="18" charset="0"/>
+                          </a:rPr>
+                        </m:ctrlPr>
+                      </m:sSubPr>
+                      <m:e>
+                        <m:r>
+                          <a:rPr lang="en-US" sz="2400" i="1">
+                            <a:latin typeface="Cambria Math" panose="02040503050406030204" pitchFamily="18" charset="0"/>
+                          </a:rPr>
+                          <m:t>𝜎</m:t>
+                        </m:r>
+                      </m:e>
+                      <m:sub>
+                        <m:r>
+                          <a:rPr lang="en-US" sz="2400" i="1">
+                            <a:latin typeface="Cambria Math" panose="02040503050406030204" pitchFamily="18" charset="0"/>
+                          </a:rPr>
+                          <m:t>𝑟</m:t>
+                        </m:r>
+                      </m:sub>
+                    </m:sSub>
+                  </m:oMath>
+                </a14:m>
+                <a:r>
+                  <a:rPr lang="en-US" sz="2400" dirty="0">
+                    <a:latin typeface="Times" pitchFamily="2" charset="0"/>
+                  </a:rPr>
+                  <a:t> value calculation; disregarding the  particle directionality while it is traced through the mesh results in some cells receiving a larger </a:t>
+                </a:r>
+                <a14:m>
+                  <m:oMath xmlns:m="http://schemas.openxmlformats.org/officeDocument/2006/math">
+                    <m:sSub>
+                      <m:sSubPr>
+                        <m:ctrlPr>
+                          <a:rPr lang="en-US" sz="2400" i="1">
+                            <a:latin typeface="Cambria Math" panose="02040503050406030204" pitchFamily="18" charset="0"/>
+                          </a:rPr>
+                        </m:ctrlPr>
+                      </m:sSubPr>
+                      <m:e>
+                        <m:r>
+                          <a:rPr lang="en-US" sz="2400" i="1">
+                            <a:latin typeface="Cambria Math" panose="02040503050406030204" pitchFamily="18" charset="0"/>
+                          </a:rPr>
+                          <m:t>𝜎</m:t>
+                        </m:r>
+                      </m:e>
+                      <m:sub>
+                        <m:r>
+                          <a:rPr lang="en-US" sz="2400" i="1">
+                            <a:latin typeface="Cambria Math" panose="02040503050406030204" pitchFamily="18" charset="0"/>
+                          </a:rPr>
+                          <m:t>𝑟</m:t>
+                        </m:r>
+                      </m:sub>
+                    </m:sSub>
+                  </m:oMath>
+                </a14:m>
+                <a:r>
+                  <a:rPr lang="en-US" sz="2400" dirty="0">
+                    <a:latin typeface="Times" pitchFamily="2" charset="0"/>
+                  </a:rPr>
+                  <a:t> value. This is such in our case where the problem is surrounded by a void, however, once particles enter the void, they still contribute to the cells </a:t>
+                </a:r>
+                <a14:m>
+                  <m:oMath xmlns:m="http://schemas.openxmlformats.org/officeDocument/2006/math">
+                    <m:sSub>
+                      <m:sSubPr>
+                        <m:ctrlPr>
+                          <a:rPr lang="en-US" sz="2400" i="1">
+                            <a:latin typeface="Cambria Math" panose="02040503050406030204" pitchFamily="18" charset="0"/>
+                          </a:rPr>
+                        </m:ctrlPr>
+                      </m:sSubPr>
+                      <m:e>
+                        <m:r>
+                          <a:rPr lang="en-US" sz="2400" i="1">
+                            <a:latin typeface="Cambria Math" panose="02040503050406030204" pitchFamily="18" charset="0"/>
+                          </a:rPr>
+                          <m:t>𝜎</m:t>
+                        </m:r>
+                      </m:e>
+                      <m:sub>
+                        <m:r>
+                          <a:rPr lang="en-US" sz="2400" i="1">
+                            <a:latin typeface="Cambria Math" panose="02040503050406030204" pitchFamily="18" charset="0"/>
+                          </a:rPr>
+                          <m:t>𝑟</m:t>
+                        </m:r>
+                      </m:sub>
+                    </m:sSub>
+                  </m:oMath>
+                </a14:m>
+                <a:r>
+                  <a:rPr lang="en-US" sz="2400" dirty="0">
+                    <a:latin typeface="Times" pitchFamily="2" charset="0"/>
+                  </a:rPr>
+                  <a:t> value.</a:t>
+                </a:r>
+              </a:p>
+            </p:txBody>
+          </p:sp>
+        </mc:Choice>
+        <mc:Fallback>
+          <p:sp>
+            <p:nvSpPr>
+              <p:cNvPr id="30" name="TextBox 29">
+                <a:extLst>
+                  <a:ext uri="{FF2B5EF4-FFF2-40B4-BE49-F238E27FC236}">
+                    <a16:creationId xmlns:a16="http://schemas.microsoft.com/office/drawing/2014/main" id="{03EB4E38-B560-3B45-8FF4-E6E431DB0D35}"/>
+                  </a:ext>
+                </a:extLst>
+              </p:cNvPr>
+              <p:cNvSpPr txBox="1">
+                <a:spLocks noRot="1" noChangeAspect="1" noMove="1" noResize="1" noEditPoints="1" noAdjustHandles="1" noChangeArrowheads="1" noChangeShapeType="1" noTextEdit="1"/>
+              </p:cNvSpPr>
+              <p:nvPr/>
+            </p:nvSpPr>
+            <p:spPr>
+              <a:xfrm>
+                <a:off x="35030825" y="4545596"/>
+                <a:ext cx="5138904" cy="6155531"/>
+              </a:xfrm>
+              <a:prstGeom prst="rect">
+                <a:avLst/>
+              </a:prstGeom>
+              <a:blipFill>
+                <a:blip r:embed="rId11"/>
+                <a:stretch>
+                  <a:fillRect l="-1724" t="-617" r="-1724" b="-1235"/>
+                </a:stretch>
+              </a:blipFill>
+            </p:spPr>
+            <p:txBody>
+              <a:bodyPr/>
+              <a:lstStyle/>
+              <a:p>
+                <a:r>
+                  <a:rPr lang="en-US">
+                    <a:noFill/>
+                  </a:rPr>
+                  <a:t> </a:t>
+                </a:r>
+              </a:p>
+            </p:txBody>
+          </p:sp>
+        </mc:Fallback>
+      </mc:AlternateContent>
+      <p:pic>
+        <p:nvPicPr>
+          <p:cNvPr id="24" name="Picture 23">
             <a:extLst>
               <a:ext uri="{FF2B5EF4-FFF2-40B4-BE49-F238E27FC236}">
-                <a16:creationId xmlns:a16="http://schemas.microsoft.com/office/drawing/2014/main" id="{EFAA4296-C006-3D4C-AC52-0119C83E674D}"/>
-              </a:ext>
-            </a:extLst>
-          </p:cNvPr>
-          <p:cNvSpPr txBox="1"/>
-          <p:nvPr/>
-        </p:nvSpPr>
-        <p:spPr>
-          <a:xfrm>
-            <a:off x="23327054" y="15248592"/>
-            <a:ext cx="3744137" cy="6155531"/>
-          </a:xfrm>
-          <a:prstGeom prst="rect">
-            <a:avLst/>
-          </a:prstGeom>
-          <a:noFill/>
-        </p:spPr>
-        <p:txBody>
-          <a:bodyPr wrap="square" rtlCol="0">
-            <a:spAutoFit/>
-          </a:bodyPr>
-          <a:lstStyle/>
-          <a:p>
-            <a:r>
-              <a:rPr lang="en-US" sz="2400" i="1" dirty="0">
-                <a:latin typeface="Times" pitchFamily="2" charset="0"/>
-              </a:rPr>
-              <a:t>Figure 1: </a:t>
-            </a:r>
-          </a:p>
-          <a:p>
-            <a:endParaRPr lang="en-US" sz="1000" i="1" dirty="0">
-              <a:latin typeface="Times" pitchFamily="2" charset="0"/>
-            </a:endParaRPr>
-          </a:p>
-          <a:p>
-            <a:pPr algn="just"/>
-            <a:r>
-              <a:rPr lang="en-US" sz="2400" dirty="0">
-                <a:latin typeface="Times" pitchFamily="2" charset="0"/>
-              </a:rPr>
-              <a:t>A graph showing the figure of merits (FoM) of the regular tally method as well as the response function. A higher FoM corresponds to a method that provides less variance in a more efficient span of time. This figure shows that after approx. 50k particles, our method results in a significantly improved FoM compared to a regular tally. This provides a strong basis for the usefulness of our method.</a:t>
-            </a:r>
-          </a:p>
-        </p:txBody>
-      </p:sp>
-      <p:pic>
-        <p:nvPicPr>
-          <p:cNvPr id="16" name="Picture 15">
-            <a:extLst>
-              <a:ext uri="{FF2B5EF4-FFF2-40B4-BE49-F238E27FC236}">
-                <a16:creationId xmlns:a16="http://schemas.microsoft.com/office/drawing/2014/main" id="{E2CAD626-133C-4548-BA02-CDDBC0030142}"/>
+                <a16:creationId xmlns:a16="http://schemas.microsoft.com/office/drawing/2014/main" id="{B075776D-9F42-9242-8CC3-1695C50A19EB}"/>
               </a:ext>
             </a:extLst>
           </p:cNvPr>
@@ -7650,72 +7750,21 @@
           <p:nvPr/>
         </p:nvPicPr>
         <p:blipFill>
-          <a:blip r:embed="rId7"/>
+          <a:blip r:embed="rId12"/>
           <a:stretch>
             <a:fillRect/>
           </a:stretch>
         </p:blipFill>
         <p:spPr>
           <a:xfrm>
-            <a:off x="14341718" y="22009128"/>
-            <a:ext cx="8721482" cy="6332236"/>
+            <a:off x="14257019" y="6049934"/>
+            <a:ext cx="5692934" cy="5635078"/>
           </a:xfrm>
           <a:prstGeom prst="rect">
             <a:avLst/>
           </a:prstGeom>
         </p:spPr>
       </p:pic>
-      <p:sp>
-        <p:nvSpPr>
-          <p:cNvPr id="23" name="TextBox 22">
-            <a:extLst>
-              <a:ext uri="{FF2B5EF4-FFF2-40B4-BE49-F238E27FC236}">
-                <a16:creationId xmlns:a16="http://schemas.microsoft.com/office/drawing/2014/main" id="{D8ED94E9-5886-F447-B978-3F3074CADEF2}"/>
-              </a:ext>
-            </a:extLst>
-          </p:cNvPr>
-          <p:cNvSpPr txBox="1"/>
-          <p:nvPr/>
-        </p:nvSpPr>
-        <p:spPr>
-          <a:xfrm>
-            <a:off x="23327054" y="22106592"/>
-            <a:ext cx="3744137" cy="5047536"/>
-          </a:xfrm>
-          <a:prstGeom prst="rect">
-            <a:avLst/>
-          </a:prstGeom>
-          <a:noFill/>
-        </p:spPr>
-        <p:txBody>
-          <a:bodyPr wrap="square" rtlCol="0">
-            <a:spAutoFit/>
-          </a:bodyPr>
-          <a:lstStyle/>
-          <a:p>
-            <a:r>
-              <a:rPr lang="en-US" sz="2400" i="1" dirty="0">
-                <a:latin typeface="Times" pitchFamily="2" charset="0"/>
-              </a:rPr>
-              <a:t>Figure 2: </a:t>
-            </a:r>
-          </a:p>
-          <a:p>
-            <a:endParaRPr lang="en-US" sz="1000" i="1" dirty="0">
-              <a:latin typeface="Times" pitchFamily="2" charset="0"/>
-            </a:endParaRPr>
-          </a:p>
-          <a:p>
-            <a:pPr algn="just"/>
-            <a:r>
-              <a:rPr lang="en-US" sz="2400" dirty="0">
-                <a:latin typeface="Times" pitchFamily="2" charset="0"/>
-              </a:rPr>
-              <a:t>A graph showing the average values of the flux for a point source problem as well as the accompanying variance as a function of the number of particles used in the simulation. This shows that our method has far less variance for fewer simulated particles, which implies that it is a more reliable method under these conditions. </a:t>
-            </a:r>
-          </a:p>
-        </p:txBody>
-      </p:sp>
     </p:spTree>
     <p:extLst>
       <p:ext uri="{BB962C8B-B14F-4D97-AF65-F5344CB8AC3E}">

</xml_diff>

<commit_message>
Updated figures and final draft of poster
</commit_message>
<xml_diff>
--- a/Poster and Presentation/Variance_Reduction_Poster.pptx
+++ b/Poster and Presentation/Variance_Reduction_Poster.pptx
@@ -3781,8 +3781,8 @@
         </p:nvSpPr>
         <p:spPr bwMode="auto">
           <a:xfrm>
-            <a:off x="6274940" y="-127333"/>
-            <a:ext cx="28746580" cy="2539040"/>
+            <a:off x="-1" y="-127333"/>
+            <a:ext cx="41250977" cy="2539040"/>
           </a:xfrm>
           <a:prstGeom prst="rect">
             <a:avLst/>
@@ -4317,7 +4317,7 @@
         </p:nvSpPr>
         <p:spPr>
           <a:xfrm>
-            <a:off x="27371527" y="21685103"/>
+            <a:off x="27371527" y="22887856"/>
             <a:ext cx="12798202" cy="666573"/>
           </a:xfrm>
           <a:prstGeom prst="rect">
@@ -5325,25 +5325,13 @@
                             </a:rPr>
                             <m:t>#</m:t>
                           </m:r>
-                          <m:d>
-                            <m:dPr>
-                              <m:ctrlPr>
-                                <a:rPr lang="en-US" sz="2800" b="0" i="1" dirty="0" smtClean="0">
-                                  <a:latin typeface="Cambria Math" panose="02040503050406030204" pitchFamily="18" charset="0"/>
-                                  <a:cs typeface="Times"/>
-                                </a:rPr>
-                              </m:ctrlPr>
-                            </m:dPr>
-                            <m:e>
-                              <m:r>
-                                <a:rPr lang="en-US" sz="2800" b="0" i="1" dirty="0" smtClean="0">
-                                  <a:latin typeface="Cambria Math" panose="02040503050406030204" pitchFamily="18" charset="0"/>
-                                  <a:cs typeface="Times"/>
-                                </a:rPr>
-                                <m:t>1</m:t>
-                              </m:r>
-                            </m:e>
-                          </m:d>
+                          <m:r>
+                            <a:rPr lang="en-US" sz="2800" b="0" i="1" dirty="0" smtClean="0">
+                              <a:latin typeface="Cambria Math" panose="02040503050406030204" pitchFamily="18" charset="0"/>
+                              <a:cs typeface="Times"/>
+                            </a:rPr>
+                            <m:t>#(1)</m:t>
+                          </m:r>
                         </m:e>
                       </m:eqArr>
                     </m:oMath>
@@ -6014,23 +6002,12 @@
                             </a:rPr>
                             <m:t>#</m:t>
                           </m:r>
-                          <m:d>
-                            <m:dPr>
-                              <m:ctrlPr>
-                                <a:rPr lang="en-US" sz="2800" b="0" i="1" dirty="0" smtClean="0">
-                                  <a:latin typeface="Cambria Math" panose="02040503050406030204" pitchFamily="18" charset="0"/>
-                                </a:rPr>
-                              </m:ctrlPr>
-                            </m:dPr>
-                            <m:e>
-                              <m:r>
-                                <a:rPr lang="en-US" sz="2800" b="0" i="1" dirty="0" smtClean="0">
-                                  <a:latin typeface="Cambria Math" panose="02040503050406030204" pitchFamily="18" charset="0"/>
-                                </a:rPr>
-                                <m:t>2</m:t>
-                              </m:r>
-                            </m:e>
-                          </m:d>
+                          <m:r>
+                            <a:rPr lang="en-US" sz="2800" b="0" i="1" dirty="0" smtClean="0">
+                              <a:latin typeface="Cambria Math" panose="02040503050406030204" pitchFamily="18" charset="0"/>
+                            </a:rPr>
+                            <m:t>#(2)</m:t>
+                          </m:r>
                         </m:e>
                       </m:eqArr>
                     </m:oMath>
@@ -6490,7 +6467,7 @@
         </p:nvSpPr>
         <p:spPr>
           <a:xfrm>
-            <a:off x="14283216" y="16402022"/>
+            <a:off x="14283216" y="14858662"/>
             <a:ext cx="12798202" cy="666573"/>
           </a:xfrm>
           <a:prstGeom prst="rect">
@@ -6688,8 +6665,8 @@
         </p:blipFill>
         <p:spPr>
           <a:xfrm>
-            <a:off x="14341718" y="17479728"/>
-            <a:ext cx="8721482" cy="6588911"/>
+            <a:off x="14298175" y="15718654"/>
+            <a:ext cx="7081368" cy="4526588"/>
           </a:xfrm>
           <a:prstGeom prst="rect">
             <a:avLst/>
@@ -6710,8 +6687,8 @@
         </p:nvSpPr>
         <p:spPr>
           <a:xfrm>
-            <a:off x="23327054" y="17479728"/>
-            <a:ext cx="3744137" cy="6155531"/>
+            <a:off x="21515201" y="15767034"/>
+            <a:ext cx="5686393" cy="4308872"/>
           </a:xfrm>
           <a:prstGeom prst="rect">
             <a:avLst/>
@@ -6742,41 +6719,11 @@
               <a:rPr lang="en-US" sz="2400" dirty="0">
                 <a:latin typeface="Times" pitchFamily="2" charset="0"/>
               </a:rPr>
-              <a:t>A graph showing the figure of merits (FoM) of the regular tally method as well as the response function. A higher FoM corresponds to a method that provides less variance in a more efficient span of time. This figure shows that after approx. 50k particles, our method results in a significantly improved FoM compared to a regular tally. This provides a strong basis for the usefulness of our method.</a:t>
-            </a:r>
-          </a:p>
-        </p:txBody>
-      </p:sp>
-      <p:pic>
-        <p:nvPicPr>
-          <p:cNvPr id="16" name="Picture 15">
-            <a:extLst>
-              <a:ext uri="{FF2B5EF4-FFF2-40B4-BE49-F238E27FC236}">
-                <a16:creationId xmlns:a16="http://schemas.microsoft.com/office/drawing/2014/main" id="{E2CAD626-133C-4548-BA02-CDDBC0030142}"/>
-              </a:ext>
-            </a:extLst>
-          </p:cNvPr>
-          <p:cNvPicPr>
-            <a:picLocks noChangeAspect="1"/>
-          </p:cNvPicPr>
-          <p:nvPr/>
-        </p:nvPicPr>
-        <p:blipFill>
-          <a:blip r:embed="rId6"/>
-          <a:stretch>
-            <a:fillRect/>
-          </a:stretch>
-        </p:blipFill>
-        <p:spPr>
-          <a:xfrm>
-            <a:off x="14341718" y="24240264"/>
-            <a:ext cx="8721482" cy="6332236"/>
-          </a:xfrm>
-          <a:prstGeom prst="rect">
-            <a:avLst/>
-          </a:prstGeom>
-        </p:spPr>
-      </p:pic>
+              <a:t>A graph showing the figure of merits (FoM) of the regular tally method as well as the response function. A higher FoM corresponds to a method that provides less variance in a more efficient span of time. This figure shows that after approx. 50k particles, our method results in a greatly improved FoM compared to a regular tally. This provides a strong basis for the usefulness of our method.</a:t>
+            </a:r>
+          </a:p>
+        </p:txBody>
+      </p:sp>
       <p:sp>
         <p:nvSpPr>
           <p:cNvPr id="23" name="TextBox 22">
@@ -6791,8 +6738,8 @@
         </p:nvSpPr>
         <p:spPr>
           <a:xfrm>
-            <a:off x="23327054" y="24337728"/>
-            <a:ext cx="3744137" cy="5047536"/>
+            <a:off x="21515202" y="20421453"/>
+            <a:ext cx="5555990" cy="3570208"/>
           </a:xfrm>
           <a:prstGeom prst="rect">
             <a:avLst/>
@@ -6828,8 +6775,8 @@
           </a:p>
         </p:txBody>
       </p:sp>
-      <mc:AlternateContent xmlns:mc="http://schemas.openxmlformats.org/markup-compatibility/2006" xmlns:a14="http://schemas.microsoft.com/office/drawing/2010/main">
-        <mc:Choice Requires="a14">
+      <mc:AlternateContent xmlns:mc="http://schemas.openxmlformats.org/markup-compatibility/2006">
+        <mc:Choice xmlns:a14="http://schemas.microsoft.com/office/drawing/2010/main" Requires="a14">
           <p:sp>
             <p:nvSpPr>
               <p:cNvPr id="31" name="TextBox 30">
@@ -6844,8 +6791,8 @@
             </p:nvSpPr>
             <p:spPr>
               <a:xfrm>
-                <a:off x="19949952" y="6142145"/>
-                <a:ext cx="7121239" cy="5063759"/>
+                <a:off x="19474582" y="6142145"/>
+                <a:ext cx="7596610" cy="4694427"/>
               </a:xfrm>
               <a:prstGeom prst="rect">
                 <a:avLst/>
@@ -6999,7 +6946,7 @@
             </p:txBody>
           </p:sp>
         </mc:Choice>
-        <mc:Fallback xmlns="">
+        <mc:Fallback>
           <p:sp>
             <p:nvSpPr>
               <p:cNvPr id="31" name="TextBox 30">
@@ -7016,16 +6963,16 @@
             </p:nvSpPr>
             <p:spPr>
               <a:xfrm>
-                <a:off x="19949952" y="6142145"/>
-                <a:ext cx="7121239" cy="5063759"/>
+                <a:off x="19474582" y="6142145"/>
+                <a:ext cx="7596610" cy="4694427"/>
               </a:xfrm>
               <a:prstGeom prst="rect">
                 <a:avLst/>
               </a:prstGeom>
               <a:blipFill>
-                <a:blip r:embed="rId7"/>
+                <a:blip r:embed="rId6"/>
                 <a:stretch>
-                  <a:fillRect l="-1246" t="-1003" r="-1068" b="-1504"/>
+                  <a:fillRect l="-1167" t="-1081" r="-1167" b="-2162"/>
                 </a:stretch>
               </a:blipFill>
             </p:spPr>
@@ -7044,8 +6991,8 @@
           </p:sp>
         </mc:Fallback>
       </mc:AlternateContent>
-      <mc:AlternateContent xmlns:mc="http://schemas.openxmlformats.org/markup-compatibility/2006" xmlns:a14="http://schemas.microsoft.com/office/drawing/2010/main">
-        <mc:Choice Requires="a14">
+      <mc:AlternateContent xmlns:mc="http://schemas.openxmlformats.org/markup-compatibility/2006">
+        <mc:Choice xmlns:a14="http://schemas.microsoft.com/office/drawing/2010/main" Requires="a14">
           <p:sp>
             <p:nvSpPr>
               <p:cNvPr id="34" name="Rectangle 33">
@@ -7060,8 +7007,8 @@
             </p:nvSpPr>
             <p:spPr>
               <a:xfrm>
-                <a:off x="14267734" y="11576032"/>
-                <a:ext cx="12798202" cy="4313297"/>
+                <a:off x="14267734" y="11034161"/>
+                <a:ext cx="12798202" cy="3820854"/>
               </a:xfrm>
               <a:prstGeom prst="rect">
                 <a:avLst/>
@@ -7089,7 +7036,7 @@
                     <a:latin typeface="Times"/>
                     <a:cs typeface="Times"/>
                   </a:rPr>
-                  <a:t> 1. Upon creation, a contribution is added to the tally accd. To</a:t>
+                  <a:t>    1. Upon creation, a contribution is added to the tally accd. to</a:t>
                 </a:r>
               </a:p>
               <a:p>
@@ -7314,25 +7261,13 @@
                             </a:rPr>
                             <m:t> #</m:t>
                           </m:r>
-                          <m:d>
-                            <m:dPr>
-                              <m:ctrlPr>
-                                <a:rPr lang="en-US" sz="3200" i="1">
-                                  <a:latin typeface="Cambria Math" panose="02040503050406030204" pitchFamily="18" charset="0"/>
-                                  <a:cs typeface="Times"/>
-                                </a:rPr>
-                              </m:ctrlPr>
-                            </m:dPr>
-                            <m:e>
-                              <m:r>
-                                <a:rPr lang="en-US" sz="3200" i="1">
-                                  <a:latin typeface="Cambria Math" panose="02040503050406030204" pitchFamily="18" charset="0"/>
-                                  <a:cs typeface="Times"/>
-                                </a:rPr>
-                                <m:t>3</m:t>
-                              </m:r>
-                            </m:e>
-                          </m:d>
+                          <m:r>
+                            <a:rPr lang="en-US" sz="3200" b="0" i="1" smtClean="0">
+                              <a:latin typeface="Cambria Math" panose="02040503050406030204" pitchFamily="18" charset="0"/>
+                              <a:cs typeface="Times"/>
+                            </a:rPr>
+                            <m:t>#(3)</m:t>
+                          </m:r>
                         </m:e>
                       </m:eqArr>
                     </m:oMath>
@@ -7360,17 +7295,7 @@
                     <a:latin typeface="Times"/>
                     <a:cs typeface="Times"/>
                   </a:rPr>
-                  <a:t>    3. At every subsequent scattering event, a contribution is added to tally</a:t>
-                </a:r>
-              </a:p>
-              <a:p>
-                <a:pPr algn="just"/>
-                <a:r>
-                  <a:rPr lang="en-US" sz="3200" dirty="0">
-                    <a:latin typeface="Times"/>
-                    <a:cs typeface="Times"/>
-                  </a:rPr>
-                  <a:t>        accd. to Eq. (3). </a:t>
+                  <a:t>    3. At every scattering event, a contribution is added to tally via Eq. (3). </a:t>
                 </a:r>
               </a:p>
               <a:p>
@@ -7386,7 +7311,7 @@
             </p:txBody>
           </p:sp>
         </mc:Choice>
-        <mc:Fallback xmlns="">
+        <mc:Fallback>
           <p:sp>
             <p:nvSpPr>
               <p:cNvPr id="34" name="Rectangle 33">
@@ -7403,16 +7328,16 @@
             </p:nvSpPr>
             <p:spPr>
               <a:xfrm>
-                <a:off x="14267734" y="11576032"/>
-                <a:ext cx="12798202" cy="4313297"/>
+                <a:off x="14267734" y="11034161"/>
+                <a:ext cx="12798202" cy="3820854"/>
               </a:xfrm>
               <a:prstGeom prst="rect">
                 <a:avLst/>
               </a:prstGeom>
               <a:blipFill>
-                <a:blip r:embed="rId9"/>
+                <a:blip r:embed="rId7"/>
                 <a:stretch>
-                  <a:fillRect l="-1090" t="-1466" r="-1189" b="-3812"/>
+                  <a:fillRect l="-1090" t="-1987" r="-1189" b="-3974"/>
                 </a:stretch>
               </a:blipFill>
             </p:spPr>
@@ -7446,15 +7371,15 @@
           <p:nvPr/>
         </p:nvPicPr>
         <p:blipFill>
-          <a:blip r:embed="rId10"/>
+          <a:blip r:embed="rId8"/>
           <a:stretch>
             <a:fillRect/>
           </a:stretch>
         </p:blipFill>
         <p:spPr>
           <a:xfrm>
-            <a:off x="27424910" y="4197602"/>
-            <a:ext cx="7596610" cy="6836949"/>
+            <a:off x="27424910" y="4197603"/>
+            <a:ext cx="7305578" cy="6575020"/>
           </a:xfrm>
           <a:prstGeom prst="rect">
             <a:avLst/>
@@ -7477,8 +7402,8 @@
             </p:nvSpPr>
             <p:spPr>
               <a:xfrm>
-                <a:off x="35030825" y="4545596"/>
-                <a:ext cx="5138904" cy="6155531"/>
+                <a:off x="34730488" y="4342394"/>
+                <a:ext cx="5439241" cy="6155531"/>
               </a:xfrm>
               <a:prstGeom prst="rect">
                 <a:avLst/>
@@ -7495,7 +7420,7 @@
                   <a:rPr lang="en-US" sz="2400" i="1" dirty="0">
                     <a:latin typeface="Times" pitchFamily="2" charset="0"/>
                   </a:rPr>
-                  <a:t>Figure 4: </a:t>
+                  <a:t>Figure 5: </a:t>
                 </a:r>
               </a:p>
               <a:p>
@@ -7707,16 +7632,16 @@
             </p:nvSpPr>
             <p:spPr>
               <a:xfrm>
-                <a:off x="35030825" y="4545596"/>
-                <a:ext cx="5138904" cy="6155531"/>
+                <a:off x="34730488" y="4342394"/>
+                <a:ext cx="5439241" cy="6155531"/>
               </a:xfrm>
               <a:prstGeom prst="rect">
                 <a:avLst/>
               </a:prstGeom>
               <a:blipFill>
-                <a:blip r:embed="rId11"/>
+                <a:blip r:embed="rId9"/>
                 <a:stretch>
-                  <a:fillRect l="-1724" t="-617" r="-1724" b="-1235"/>
+                  <a:fillRect l="-1632" t="-823" r="-1632" b="-1235"/>
                 </a:stretch>
               </a:blipFill>
             </p:spPr>
@@ -7750,6 +7675,117 @@
           <p:nvPr/>
         </p:nvPicPr>
         <p:blipFill>
+          <a:blip r:embed="rId10"/>
+          <a:stretch>
+            <a:fillRect/>
+          </a:stretch>
+        </p:blipFill>
+        <p:spPr>
+          <a:xfrm>
+            <a:off x="14257019" y="6049934"/>
+            <a:ext cx="5189756" cy="5137014"/>
+          </a:xfrm>
+          <a:prstGeom prst="rect">
+            <a:avLst/>
+          </a:prstGeom>
+        </p:spPr>
+      </p:pic>
+      <p:sp>
+        <p:nvSpPr>
+          <p:cNvPr id="36" name="TextBox 35">
+            <a:extLst>
+              <a:ext uri="{FF2B5EF4-FFF2-40B4-BE49-F238E27FC236}">
+                <a16:creationId xmlns:a16="http://schemas.microsoft.com/office/drawing/2014/main" id="{99F7C35D-794B-AA43-B131-547A789FB2E9}"/>
+              </a:ext>
+            </a:extLst>
+          </p:cNvPr>
+          <p:cNvSpPr txBox="1"/>
+          <p:nvPr/>
+        </p:nvSpPr>
+        <p:spPr>
+          <a:xfrm>
+            <a:off x="22664285" y="24942472"/>
+            <a:ext cx="4310172" cy="5416868"/>
+          </a:xfrm>
+          <a:prstGeom prst="rect">
+            <a:avLst/>
+          </a:prstGeom>
+          <a:noFill/>
+        </p:spPr>
+        <p:txBody>
+          <a:bodyPr wrap="square" rtlCol="0">
+            <a:spAutoFit/>
+          </a:bodyPr>
+          <a:lstStyle/>
+          <a:p>
+            <a:r>
+              <a:rPr lang="en-US" sz="2400" i="1" dirty="0">
+                <a:latin typeface="Times" pitchFamily="2" charset="0"/>
+              </a:rPr>
+              <a:t>Figure 4: </a:t>
+            </a:r>
+          </a:p>
+          <a:p>
+            <a:endParaRPr lang="en-US" sz="1000" i="1" dirty="0">
+              <a:latin typeface="Times" pitchFamily="2" charset="0"/>
+            </a:endParaRPr>
+          </a:p>
+          <a:p>
+            <a:pPr algn="just"/>
+            <a:r>
+              <a:rPr lang="en-US" sz="2400" dirty="0">
+                <a:latin typeface="Times" pitchFamily="2" charset="0"/>
+              </a:rPr>
+              <a:t>A graph demonstrating the variance of the regular tally, and response function tally for the simplified supernova simulation from Fig. 5 as a function of the simulation time. Ten independent simulations were run with unique random number seeds. The general trends indicate that the response function method has a significantly lower variance at any given time step compared to the regular tally method</a:t>
+            </a:r>
+          </a:p>
+        </p:txBody>
+      </p:sp>
+      <p:pic>
+        <p:nvPicPr>
+          <p:cNvPr id="28" name="Picture 27">
+            <a:extLst>
+              <a:ext uri="{FF2B5EF4-FFF2-40B4-BE49-F238E27FC236}">
+                <a16:creationId xmlns:a16="http://schemas.microsoft.com/office/drawing/2014/main" id="{9714709E-1089-F545-AF53-20DBC71BCB1F}"/>
+              </a:ext>
+            </a:extLst>
+          </p:cNvPr>
+          <p:cNvPicPr>
+            <a:picLocks noChangeAspect="1"/>
+          </p:cNvPicPr>
+          <p:nvPr/>
+        </p:nvPicPr>
+        <p:blipFill>
+          <a:blip r:embed="rId11"/>
+          <a:stretch>
+            <a:fillRect/>
+          </a:stretch>
+        </p:blipFill>
+        <p:spPr>
+          <a:xfrm>
+            <a:off x="14342486" y="20387313"/>
+            <a:ext cx="7037057" cy="4353471"/>
+          </a:xfrm>
+          <a:prstGeom prst="rect">
+            <a:avLst/>
+          </a:prstGeom>
+        </p:spPr>
+      </p:pic>
+      <p:pic>
+        <p:nvPicPr>
+          <p:cNvPr id="38" name="Picture 37">
+            <a:extLst>
+              <a:ext uri="{FF2B5EF4-FFF2-40B4-BE49-F238E27FC236}">
+                <a16:creationId xmlns:a16="http://schemas.microsoft.com/office/drawing/2014/main" id="{93E839C1-B844-D441-9E4E-20E35C750C0D}"/>
+              </a:ext>
+            </a:extLst>
+          </p:cNvPr>
+          <p:cNvPicPr>
+            <a:picLocks noChangeAspect="1"/>
+          </p:cNvPicPr>
+          <p:nvPr/>
+        </p:nvPicPr>
+        <p:blipFill>
           <a:blip r:embed="rId12"/>
           <a:stretch>
             <a:fillRect/>
@@ -7757,14 +7793,434 @@
         </p:blipFill>
         <p:spPr>
           <a:xfrm>
-            <a:off x="14257019" y="6049934"/>
-            <a:ext cx="5692934" cy="5635078"/>
+            <a:off x="14342486" y="24900256"/>
+            <a:ext cx="8045912" cy="5331873"/>
           </a:xfrm>
           <a:prstGeom prst="rect">
             <a:avLst/>
           </a:prstGeom>
         </p:spPr>
       </p:pic>
+      <p:pic>
+        <p:nvPicPr>
+          <p:cNvPr id="42" name="Picture 41">
+            <a:extLst>
+              <a:ext uri="{FF2B5EF4-FFF2-40B4-BE49-F238E27FC236}">
+                <a16:creationId xmlns:a16="http://schemas.microsoft.com/office/drawing/2014/main" id="{7BB58035-7436-0E4B-BBE0-15D02A96427B}"/>
+              </a:ext>
+            </a:extLst>
+          </p:cNvPr>
+          <p:cNvPicPr>
+            <a:picLocks noChangeAspect="1"/>
+          </p:cNvPicPr>
+          <p:nvPr/>
+        </p:nvPicPr>
+        <p:blipFill>
+          <a:blip r:embed="rId13"/>
+          <a:stretch>
+            <a:fillRect/>
+          </a:stretch>
+        </p:blipFill>
+        <p:spPr>
+          <a:xfrm>
+            <a:off x="27545086" y="10734701"/>
+            <a:ext cx="7959162" cy="5114998"/>
+          </a:xfrm>
+          <a:prstGeom prst="rect">
+            <a:avLst/>
+          </a:prstGeom>
+        </p:spPr>
+      </p:pic>
+      <p:pic>
+        <p:nvPicPr>
+          <p:cNvPr id="44" name="Picture 43">
+            <a:extLst>
+              <a:ext uri="{FF2B5EF4-FFF2-40B4-BE49-F238E27FC236}">
+                <a16:creationId xmlns:a16="http://schemas.microsoft.com/office/drawing/2014/main" id="{8B072329-C569-2642-AAA6-75D9CCC8FA58}"/>
+              </a:ext>
+            </a:extLst>
+          </p:cNvPr>
+          <p:cNvPicPr>
+            <a:picLocks noChangeAspect="1"/>
+          </p:cNvPicPr>
+          <p:nvPr/>
+        </p:nvPicPr>
+        <p:blipFill>
+          <a:blip r:embed="rId14"/>
+          <a:stretch>
+            <a:fillRect/>
+          </a:stretch>
+        </p:blipFill>
+        <p:spPr>
+          <a:xfrm>
+            <a:off x="27631386" y="16022898"/>
+            <a:ext cx="5750335" cy="5114998"/>
+          </a:xfrm>
+          <a:prstGeom prst="rect">
+            <a:avLst/>
+          </a:prstGeom>
+        </p:spPr>
+      </p:pic>
+      <p:pic>
+        <p:nvPicPr>
+          <p:cNvPr id="46" name="Picture 45">
+            <a:extLst>
+              <a:ext uri="{FF2B5EF4-FFF2-40B4-BE49-F238E27FC236}">
+                <a16:creationId xmlns:a16="http://schemas.microsoft.com/office/drawing/2014/main" id="{804D691F-AECB-9A46-B6A4-99A9C2B910FB}"/>
+              </a:ext>
+            </a:extLst>
+          </p:cNvPr>
+          <p:cNvPicPr>
+            <a:picLocks noChangeAspect="1"/>
+          </p:cNvPicPr>
+          <p:nvPr/>
+        </p:nvPicPr>
+        <p:blipFill>
+          <a:blip r:embed="rId15"/>
+          <a:stretch>
+            <a:fillRect/>
+          </a:stretch>
+        </p:blipFill>
+        <p:spPr>
+          <a:xfrm>
+            <a:off x="33584638" y="16021324"/>
+            <a:ext cx="5750335" cy="5150672"/>
+          </a:xfrm>
+          <a:prstGeom prst="rect">
+            <a:avLst/>
+          </a:prstGeom>
+        </p:spPr>
+      </p:pic>
+      <p:sp>
+        <p:nvSpPr>
+          <p:cNvPr id="47" name="Rectangle 46">
+            <a:extLst>
+              <a:ext uri="{FF2B5EF4-FFF2-40B4-BE49-F238E27FC236}">
+                <a16:creationId xmlns:a16="http://schemas.microsoft.com/office/drawing/2014/main" id="{36EE02C2-C091-8D42-9631-D49C947A0CAA}"/>
+              </a:ext>
+            </a:extLst>
+          </p:cNvPr>
+          <p:cNvSpPr/>
+          <p:nvPr/>
+        </p:nvSpPr>
+        <p:spPr>
+          <a:xfrm>
+            <a:off x="27422326" y="27991568"/>
+            <a:ext cx="12798202" cy="666573"/>
+          </a:xfrm>
+          <a:prstGeom prst="rect">
+            <a:avLst/>
+          </a:prstGeom>
+          <a:solidFill>
+            <a:schemeClr val="accent1">
+              <a:lumMod val="75000"/>
+            </a:schemeClr>
+          </a:solidFill>
+          <a:ln w="12700"/>
+        </p:spPr>
+        <p:style>
+          <a:lnRef idx="2">
+            <a:schemeClr val="accent1">
+              <a:shade val="50000"/>
+            </a:schemeClr>
+          </a:lnRef>
+          <a:fillRef idx="1">
+            <a:schemeClr val="accent1"/>
+          </a:fillRef>
+          <a:effectRef idx="0">
+            <a:schemeClr val="accent1"/>
+          </a:effectRef>
+          <a:fontRef idx="minor">
+            <a:schemeClr val="lt1"/>
+          </a:fontRef>
+        </p:style>
+        <p:txBody>
+          <a:bodyPr lIns="68568" tIns="34284" rIns="68568" bIns="34284" rtlCol="0" anchor="ctr"/>
+          <a:lstStyle>
+            <a:lvl1pPr>
+              <a:defRPr>
+                <a:solidFill>
+                  <a:schemeClr val="lt1"/>
+                </a:solidFill>
+                <a:latin typeface="+mn-lt"/>
+                <a:ea typeface="+mn-ea"/>
+                <a:cs typeface="+mn-cs"/>
+              </a:defRPr>
+            </a:lvl1pPr>
+            <a:lvl2pPr>
+              <a:defRPr>
+                <a:solidFill>
+                  <a:schemeClr val="lt1"/>
+                </a:solidFill>
+                <a:latin typeface="+mn-lt"/>
+                <a:ea typeface="+mn-ea"/>
+                <a:cs typeface="+mn-cs"/>
+              </a:defRPr>
+            </a:lvl2pPr>
+            <a:lvl3pPr>
+              <a:defRPr>
+                <a:solidFill>
+                  <a:schemeClr val="lt1"/>
+                </a:solidFill>
+                <a:latin typeface="+mn-lt"/>
+                <a:ea typeface="+mn-ea"/>
+                <a:cs typeface="+mn-cs"/>
+              </a:defRPr>
+            </a:lvl3pPr>
+            <a:lvl4pPr>
+              <a:defRPr>
+                <a:solidFill>
+                  <a:schemeClr val="lt1"/>
+                </a:solidFill>
+                <a:latin typeface="+mn-lt"/>
+                <a:ea typeface="+mn-ea"/>
+                <a:cs typeface="+mn-cs"/>
+              </a:defRPr>
+            </a:lvl4pPr>
+            <a:lvl5pPr>
+              <a:defRPr>
+                <a:solidFill>
+                  <a:schemeClr val="lt1"/>
+                </a:solidFill>
+                <a:latin typeface="+mn-lt"/>
+                <a:ea typeface="+mn-ea"/>
+                <a:cs typeface="+mn-cs"/>
+              </a:defRPr>
+            </a:lvl5pPr>
+            <a:lvl6pPr>
+              <a:defRPr>
+                <a:solidFill>
+                  <a:schemeClr val="lt1"/>
+                </a:solidFill>
+                <a:latin typeface="+mn-lt"/>
+                <a:ea typeface="+mn-ea"/>
+                <a:cs typeface="+mn-cs"/>
+              </a:defRPr>
+            </a:lvl6pPr>
+            <a:lvl7pPr>
+              <a:defRPr>
+                <a:solidFill>
+                  <a:schemeClr val="lt1"/>
+                </a:solidFill>
+                <a:latin typeface="+mn-lt"/>
+                <a:ea typeface="+mn-ea"/>
+                <a:cs typeface="+mn-cs"/>
+              </a:defRPr>
+            </a:lvl7pPr>
+            <a:lvl8pPr>
+              <a:defRPr>
+                <a:solidFill>
+                  <a:schemeClr val="lt1"/>
+                </a:solidFill>
+                <a:latin typeface="+mn-lt"/>
+                <a:ea typeface="+mn-ea"/>
+                <a:cs typeface="+mn-cs"/>
+              </a:defRPr>
+            </a:lvl8pPr>
+            <a:lvl9pPr>
+              <a:defRPr>
+                <a:solidFill>
+                  <a:schemeClr val="lt1"/>
+                </a:solidFill>
+                <a:latin typeface="+mn-lt"/>
+                <a:ea typeface="+mn-ea"/>
+                <a:cs typeface="+mn-cs"/>
+              </a:defRPr>
+            </a:lvl9pPr>
+          </a:lstStyle>
+          <a:p>
+            <a:pPr algn="ctr"/>
+            <a:r>
+              <a:rPr lang="en-US" sz="4400" b="1" kern="1200" dirty="0">
+                <a:solidFill>
+                  <a:srgbClr val="FFFFFF"/>
+                </a:solidFill>
+                <a:latin typeface="Arial"/>
+                <a:cs typeface="Arial"/>
+              </a:rPr>
+              <a:t>Acknowledgements</a:t>
+            </a:r>
+          </a:p>
+        </p:txBody>
+      </p:sp>
+      <p:sp>
+        <p:nvSpPr>
+          <p:cNvPr id="48" name="Rectangle 47">
+            <a:extLst>
+              <a:ext uri="{FF2B5EF4-FFF2-40B4-BE49-F238E27FC236}">
+                <a16:creationId xmlns:a16="http://schemas.microsoft.com/office/drawing/2014/main" id="{88565321-FE74-9941-98BC-1140DF0C218B}"/>
+              </a:ext>
+            </a:extLst>
+          </p:cNvPr>
+          <p:cNvSpPr/>
+          <p:nvPr/>
+        </p:nvSpPr>
+        <p:spPr>
+          <a:xfrm>
+            <a:off x="27389021" y="29049528"/>
+            <a:ext cx="12798202" cy="1077218"/>
+          </a:xfrm>
+          <a:prstGeom prst="rect">
+            <a:avLst/>
+          </a:prstGeom>
+        </p:spPr>
+        <p:txBody>
+          <a:bodyPr wrap="square">
+            <a:spAutoFit/>
+          </a:bodyPr>
+          <a:lstStyle/>
+          <a:p>
+            <a:pPr algn="just"/>
+            <a:r>
+              <a:rPr lang="en-US" sz="3200" dirty="0">
+                <a:latin typeface="Times"/>
+                <a:cs typeface="Times"/>
+              </a:rPr>
+              <a:t> We would like to thank the 2019 XCP Computational Physics Workshop and their directors for making this research possible.</a:t>
+            </a:r>
+          </a:p>
+        </p:txBody>
+      </p:sp>
+      <p:sp>
+        <p:nvSpPr>
+          <p:cNvPr id="49" name="TextBox 48">
+            <a:extLst>
+              <a:ext uri="{FF2B5EF4-FFF2-40B4-BE49-F238E27FC236}">
+                <a16:creationId xmlns:a16="http://schemas.microsoft.com/office/drawing/2014/main" id="{4DAF5593-4DD1-9740-AC93-B63000E12727}"/>
+              </a:ext>
+            </a:extLst>
+          </p:cNvPr>
+          <p:cNvSpPr txBox="1"/>
+          <p:nvPr/>
+        </p:nvSpPr>
+        <p:spPr>
+          <a:xfrm>
+            <a:off x="35624424" y="10793997"/>
+            <a:ext cx="4562237" cy="4308872"/>
+          </a:xfrm>
+          <a:prstGeom prst="rect">
+            <a:avLst/>
+          </a:prstGeom>
+          <a:noFill/>
+        </p:spPr>
+        <p:txBody>
+          <a:bodyPr wrap="square" rtlCol="0">
+            <a:spAutoFit/>
+          </a:bodyPr>
+          <a:lstStyle/>
+          <a:p>
+            <a:r>
+              <a:rPr lang="en-US" sz="2400" i="1" dirty="0">
+                <a:latin typeface="Times" pitchFamily="2" charset="0"/>
+              </a:rPr>
+              <a:t>Figure 6: </a:t>
+            </a:r>
+          </a:p>
+          <a:p>
+            <a:endParaRPr lang="en-US" sz="1000" i="1" dirty="0">
+              <a:latin typeface="Times" pitchFamily="2" charset="0"/>
+            </a:endParaRPr>
+          </a:p>
+          <a:p>
+            <a:pPr algn="just"/>
+            <a:r>
+              <a:rPr lang="en-US" sz="2400" dirty="0">
+                <a:latin typeface="Times" pitchFamily="2" charset="0"/>
+              </a:rPr>
+              <a:t>The relative flux calculations made by the regular tally method and the response function tally method. As in Fig. 3, the response method has a smaller variance, however, it also drastically underestimates the flux. This likely stems from the use of a spherical tally surface instead of a directional tally surface for this particular problem.</a:t>
+            </a:r>
+          </a:p>
+        </p:txBody>
+      </p:sp>
+      <p:sp>
+        <p:nvSpPr>
+          <p:cNvPr id="50" name="TextBox 49">
+            <a:extLst>
+              <a:ext uri="{FF2B5EF4-FFF2-40B4-BE49-F238E27FC236}">
+                <a16:creationId xmlns:a16="http://schemas.microsoft.com/office/drawing/2014/main" id="{6685CCAA-E1EA-C243-8907-F3F0090413E4}"/>
+              </a:ext>
+            </a:extLst>
+          </p:cNvPr>
+          <p:cNvSpPr txBox="1"/>
+          <p:nvPr/>
+        </p:nvSpPr>
+        <p:spPr>
+          <a:xfrm>
+            <a:off x="27545086" y="21004676"/>
+            <a:ext cx="12487590" cy="1723549"/>
+          </a:xfrm>
+          <a:prstGeom prst="rect">
+            <a:avLst/>
+          </a:prstGeom>
+          <a:noFill/>
+        </p:spPr>
+        <p:txBody>
+          <a:bodyPr wrap="square" rtlCol="0">
+            <a:spAutoFit/>
+          </a:bodyPr>
+          <a:lstStyle/>
+          <a:p>
+            <a:r>
+              <a:rPr lang="en-US" sz="2400" i="1" dirty="0">
+                <a:latin typeface="Times" pitchFamily="2" charset="0"/>
+              </a:rPr>
+              <a:t>Figure 7: </a:t>
+            </a:r>
+          </a:p>
+          <a:p>
+            <a:endParaRPr lang="en-US" sz="1000" i="1" dirty="0">
+              <a:latin typeface="Times" pitchFamily="2" charset="0"/>
+            </a:endParaRPr>
+          </a:p>
+          <a:p>
+            <a:pPr algn="just"/>
+            <a:r>
+              <a:rPr lang="en-US" sz="2400" dirty="0">
+                <a:latin typeface="Times" pitchFamily="2" charset="0"/>
+              </a:rPr>
+              <a:t>These plots show the electron temperature (left) and the radiative temperature (right) at the end of the simulation shown in Figs. 4, 5 &amp; 6. Overheating in the left plot likely results from small corner cells. The smearing in the right plot is an artifact stemming from the same reasons in Fig. 5.</a:t>
+            </a:r>
+          </a:p>
+        </p:txBody>
+      </p:sp>
+      <p:sp>
+        <p:nvSpPr>
+          <p:cNvPr id="51" name="Rectangle 50">
+            <a:extLst>
+              <a:ext uri="{FF2B5EF4-FFF2-40B4-BE49-F238E27FC236}">
+                <a16:creationId xmlns:a16="http://schemas.microsoft.com/office/drawing/2014/main" id="{215CEB4D-655A-2D4D-9233-1EC6CE524EB0}"/>
+              </a:ext>
+            </a:extLst>
+          </p:cNvPr>
+          <p:cNvSpPr/>
+          <p:nvPr/>
+        </p:nvSpPr>
+        <p:spPr>
+          <a:xfrm>
+            <a:off x="27367249" y="23759065"/>
+            <a:ext cx="12798202" cy="4031873"/>
+          </a:xfrm>
+          <a:prstGeom prst="rect">
+            <a:avLst/>
+          </a:prstGeom>
+        </p:spPr>
+        <p:txBody>
+          <a:bodyPr wrap="square">
+            <a:spAutoFit/>
+          </a:bodyPr>
+          <a:lstStyle/>
+          <a:p>
+            <a:pPr algn="just"/>
+            <a:r>
+              <a:rPr lang="en-US" sz="3200" dirty="0">
+                <a:latin typeface="Times"/>
+                <a:cs typeface="Times"/>
+              </a:rPr>
+              <a:t> Our investigation into the use of a response function-based variance reduction method for use in simulations modeling supernova interactions with its circumstellar medium has shown a notable improvement in variance over standard methods. Furthermore, while the geometry of the tally surface does play an impact on the calculated flux values, we would expect that with an appropriate geometry for a given problem, the response function method will match the ‘true’ flux with a statistically significant reduction in the answer variance.</a:t>
+            </a:r>
+          </a:p>
+        </p:txBody>
+      </p:sp>
     </p:spTree>
     <p:extLst>
       <p:ext uri="{BB962C8B-B14F-4D97-AF65-F5344CB8AC3E}">

</xml_diff>

<commit_message>
Updated the poster and added figures to the paper
</commit_message>
<xml_diff>
--- a/Poster and Presentation/Variance_Reduction_Poster.pptx
+++ b/Poster and Presentation/Variance_Reduction_Poster.pptx
@@ -208,7 +208,7 @@
           <a:p>
             <a:fld id="{C64D7CA3-7008-7349-8B55-6C7D24D241FF}" type="datetimeFigureOut">
               <a:rPr lang="en-US" smtClean="0"/>
-              <a:t>8/1/19</a:t>
+              <a:t>8/2/19</a:t>
             </a:fld>
             <a:endParaRPr lang="en-US"/>
           </a:p>
@@ -738,7 +738,7 @@
           <a:p>
             <a:fld id="{2FD8D12E-95C4-274C-8538-6990C022EAF5}" type="datetimeFigureOut">
               <a:rPr lang="en-US" smtClean="0"/>
-              <a:t>8/1/19</a:t>
+              <a:t>8/2/19</a:t>
             </a:fld>
             <a:endParaRPr lang="en-US"/>
           </a:p>
@@ -906,7 +906,7 @@
           <a:p>
             <a:fld id="{2FD8D12E-95C4-274C-8538-6990C022EAF5}" type="datetimeFigureOut">
               <a:rPr lang="en-US" smtClean="0"/>
-              <a:t>8/1/19</a:t>
+              <a:t>8/2/19</a:t>
             </a:fld>
             <a:endParaRPr lang="en-US"/>
           </a:p>
@@ -1084,7 +1084,7 @@
           <a:p>
             <a:fld id="{2FD8D12E-95C4-274C-8538-6990C022EAF5}" type="datetimeFigureOut">
               <a:rPr lang="en-US" smtClean="0"/>
-              <a:t>8/1/19</a:t>
+              <a:t>8/2/19</a:t>
             </a:fld>
             <a:endParaRPr lang="en-US"/>
           </a:p>
@@ -1252,7 +1252,7 @@
           <a:p>
             <a:fld id="{2FD8D12E-95C4-274C-8538-6990C022EAF5}" type="datetimeFigureOut">
               <a:rPr lang="en-US" smtClean="0"/>
-              <a:t>8/1/19</a:t>
+              <a:t>8/2/19</a:t>
             </a:fld>
             <a:endParaRPr lang="en-US"/>
           </a:p>
@@ -1497,7 +1497,7 @@
           <a:p>
             <a:fld id="{2FD8D12E-95C4-274C-8538-6990C022EAF5}" type="datetimeFigureOut">
               <a:rPr lang="en-US" smtClean="0"/>
-              <a:t>8/1/19</a:t>
+              <a:t>8/2/19</a:t>
             </a:fld>
             <a:endParaRPr lang="en-US"/>
           </a:p>
@@ -1782,7 +1782,7 @@
           <a:p>
             <a:fld id="{2FD8D12E-95C4-274C-8538-6990C022EAF5}" type="datetimeFigureOut">
               <a:rPr lang="en-US" smtClean="0"/>
-              <a:t>8/1/19</a:t>
+              <a:t>8/2/19</a:t>
             </a:fld>
             <a:endParaRPr lang="en-US"/>
           </a:p>
@@ -2201,7 +2201,7 @@
           <a:p>
             <a:fld id="{2FD8D12E-95C4-274C-8538-6990C022EAF5}" type="datetimeFigureOut">
               <a:rPr lang="en-US" smtClean="0"/>
-              <a:t>8/1/19</a:t>
+              <a:t>8/2/19</a:t>
             </a:fld>
             <a:endParaRPr lang="en-US"/>
           </a:p>
@@ -2318,7 +2318,7 @@
           <a:p>
             <a:fld id="{2FD8D12E-95C4-274C-8538-6990C022EAF5}" type="datetimeFigureOut">
               <a:rPr lang="en-US" smtClean="0"/>
-              <a:t>8/1/19</a:t>
+              <a:t>8/2/19</a:t>
             </a:fld>
             <a:endParaRPr lang="en-US"/>
           </a:p>
@@ -2413,7 +2413,7 @@
           <a:p>
             <a:fld id="{2FD8D12E-95C4-274C-8538-6990C022EAF5}" type="datetimeFigureOut">
               <a:rPr lang="en-US" smtClean="0"/>
-              <a:t>8/1/19</a:t>
+              <a:t>8/2/19</a:t>
             </a:fld>
             <a:endParaRPr lang="en-US"/>
           </a:p>
@@ -2688,7 +2688,7 @@
           <a:p>
             <a:fld id="{2FD8D12E-95C4-274C-8538-6990C022EAF5}" type="datetimeFigureOut">
               <a:rPr lang="en-US" smtClean="0"/>
-              <a:t>8/1/19</a:t>
+              <a:t>8/2/19</a:t>
             </a:fld>
             <a:endParaRPr lang="en-US"/>
           </a:p>
@@ -2940,7 +2940,7 @@
           <a:p>
             <a:fld id="{2FD8D12E-95C4-274C-8538-6990C022EAF5}" type="datetimeFigureOut">
               <a:rPr lang="en-US" smtClean="0"/>
-              <a:t>8/1/19</a:t>
+              <a:t>8/2/19</a:t>
             </a:fld>
             <a:endParaRPr lang="en-US"/>
           </a:p>
@@ -3151,7 +3151,7 @@
           <a:p>
             <a:fld id="{2FD8D12E-95C4-274C-8538-6990C022EAF5}" type="datetimeFigureOut">
               <a:rPr lang="en-US" smtClean="0"/>
-              <a:t>8/1/19</a:t>
+              <a:t>8/2/19</a:t>
             </a:fld>
             <a:endParaRPr lang="en-US"/>
           </a:p>
@@ -4317,7 +4317,7 @@
         </p:nvSpPr>
         <p:spPr>
           <a:xfrm>
-            <a:off x="27371527" y="22887856"/>
+            <a:off x="27371527" y="23040256"/>
             <a:ext cx="12798202" cy="666573"/>
           </a:xfrm>
           <a:prstGeom prst="rect">
@@ -4455,8 +4455,8 @@
           </a:p>
         </p:txBody>
       </p:sp>
-      <mc:AlternateContent xmlns:mc="http://schemas.openxmlformats.org/markup-compatibility/2006">
-        <mc:Choice xmlns:a14="http://schemas.microsoft.com/office/drawing/2010/main" Requires="a14">
+      <mc:AlternateContent xmlns:mc="http://schemas.openxmlformats.org/markup-compatibility/2006" xmlns:a14="http://schemas.microsoft.com/office/drawing/2010/main">
+        <mc:Choice Requires="a14">
           <p:sp>
             <p:nvSpPr>
               <p:cNvPr id="20" name="Rectangle 19">
@@ -4472,7 +4472,7 @@
             <p:spPr>
               <a:xfrm>
                 <a:off x="1115324" y="5234289"/>
-                <a:ext cx="12798202" cy="19051626"/>
+                <a:ext cx="12798202" cy="18805404"/>
               </a:xfrm>
               <a:prstGeom prst="rect">
                 <a:avLst/>
@@ -5323,14 +5323,7 @@
                               <a:latin typeface="Cambria Math" panose="02040503050406030204" pitchFamily="18" charset="0"/>
                               <a:cs typeface="Times"/>
                             </a:rPr>
-                            <m:t>#</m:t>
-                          </m:r>
-                          <m:r>
-                            <a:rPr lang="en-US" sz="2800" b="0" i="1" dirty="0" smtClean="0">
-                              <a:latin typeface="Cambria Math" panose="02040503050406030204" pitchFamily="18" charset="0"/>
-                              <a:cs typeface="Times"/>
-                            </a:rPr>
-                            <m:t>#(1)</m:t>
+                            <m:t>##(1)</m:t>
                           </m:r>
                         </m:e>
                       </m:eqArr>
@@ -6064,7 +6057,7 @@
                   <a:rPr lang="en-US" sz="3200" dirty="0">
                     <a:latin typeface="Times"/>
                   </a:rPr>
-                  <a:t> is Plank’s radiation function, </a:t>
+                  <a:t> is Planck’s radiation function, </a:t>
                 </a:r>
                 <a:r>
                   <a:rPr lang="en-US" sz="3200" i="1" dirty="0">
@@ -6127,7 +6120,7 @@
                   <a:rPr lang="en-US" sz="3200" dirty="0">
                     <a:latin typeface="Times"/>
                   </a:rPr>
-                  <a:t>    Implicit Monte Carlo (IMC) methods are used to model and solve time-dependent, nonlinear, radiative transfer problems with complex geometries. This method is stochastic and uses random sampling to determine how a photon moves and behaves in a material. IMC methods, however, applies two approximations: linearizing the TRT equations, and a semi-implicit discretization of time. </a:t>
+                  <a:t>    Implicit Monte Carlo (IMC) methods are used to model and solve time-dependent, nonlinear, radiative transfer problems with complex geometries. This method is stochastic and uses random sampling to determine how a photon moves and behaves in a material. The IMC method, however, applies two approximations: linearization of the TRT equations, and a semi-implicit discretization in time. </a:t>
                 </a:r>
               </a:p>
               <a:p>
@@ -6156,7 +6149,7 @@
                   <a:rPr lang="en-US" sz="3200" dirty="0">
                     <a:latin typeface="Times"/>
                   </a:rPr>
-                  <a:t>    The discretization and stochastic nature of IMC leads to inherent uncertainty, accompanied by long run times and large computational requirements for sufficient convergence. To address and counteract these issues, various variance reduction methods are implemented to ease the computational complexity while producing equivalent results.</a:t>
+                  <a:t>    The stochastic nature of IMC leads to inherent statistical uncertainty in the solution, accompanied by long run times and large computational requirements for sufficient convergence. To address and counteract these issues, various variance reduction methods are implemented to improve simulation efficiency while producing equivalent (unbiased) results.</a:t>
                 </a:r>
               </a:p>
               <a:p>
@@ -6177,7 +6170,7 @@
                   <a:rPr lang="en-US" sz="3200" dirty="0">
                     <a:latin typeface="Times"/>
                   </a:rPr>
-                  <a:t>A response function VRM is designed to reduce the variance of the approximation by increasing the number of particles that contribute to the tally. Standard IMC and implicit capture reduces variance by replacing absorption with the analytic absorption solution. However, this still requires the particle passes through the tally surface, and high scattering opacity situations will mitigate escaping flux. </a:t>
+                  <a:t>A response function VRM is designed to reduce the variance of the approximation by increasing the number of particles that contribute to solution tallies. Standard IMC and implicit capture reduces variance by replacing absorption with the analytic absorption solution. However, this still requires the particle passes through the tally surface to contribute to the solution.</a:t>
                 </a:r>
               </a:p>
               <a:p>
@@ -6201,7 +6194,7 @@
             </p:txBody>
           </p:sp>
         </mc:Choice>
-        <mc:Fallback>
+        <mc:Fallback xmlns="">
           <p:sp>
             <p:nvSpPr>
               <p:cNvPr id="20" name="Rectangle 19">
@@ -6219,7 +6212,7 @@
             <p:spPr>
               <a:xfrm>
                 <a:off x="1115324" y="5234289"/>
-                <a:ext cx="12798202" cy="19051626"/>
+                <a:ext cx="12798202" cy="18805404"/>
               </a:xfrm>
               <a:prstGeom prst="rect">
                 <a:avLst/>
@@ -6227,7 +6220,7 @@
               <a:blipFill>
                 <a:blip r:embed="rId4"/>
                 <a:stretch>
-                  <a:fillRect l="-1189" t="-333" r="-1090"/>
+                  <a:fillRect l="-1189" t="-337" r="-1090" b="-135"/>
                 </a:stretch>
               </a:blipFill>
             </p:spPr>
@@ -6431,7 +6424,7 @@
                 <a:latin typeface="Times"/>
                 <a:cs typeface="Times"/>
               </a:rPr>
-              <a:t>    The objective of this research is to investigate the advantages and drawbacks of a response function VRM for IMC simulations. Specifically, this method is analyzed for use in modeling events such as multidimensional supernova transients, and comparing the simulation results to physical observations which are computationally intensive due to their large scale and the multiple physics involved in the problem. </a:t>
+              <a:t>    The objective of this research is to investigate the advantages and drawbacks of a response function VRM for IMC simulations. Specifically, this method is analyzed for use in modeling astrophysical events such as multidimensional supernova transients. The goal is to provide high-quality simulation data to astrophysicists, who compare these results to physical observations. </a:t>
             </a:r>
           </a:p>
           <a:p>
@@ -6448,7 +6441,7 @@
                 <a:latin typeface="Times"/>
                 <a:cs typeface="Times"/>
               </a:rPr>
-              <a:t>    Additionally, the project investigates the figure of merit of the response function VRM as well as the cases in which the method breaks down. This is accomplished by analyzing the method results over a range of problems and looking at the variance of the standard vs response function based methods. </a:t>
+              <a:t>    Additionally, the project investigates the figure of merit of the response function VRM as well as the cases in which the method breaks down. This is accomplished by analyzing the method results over a range of problems and comparing the variance of the standard vs response function based methods. </a:t>
             </a:r>
           </a:p>
         </p:txBody>
@@ -6638,7 +6631,7 @@
                 <a:latin typeface="Times"/>
                 <a:cs typeface="Times"/>
               </a:rPr>
-              <a:t> The response function VRM was designed and implemented around a simplified point source problem of a single heated cell as show in Fig. 1:</a:t>
+              <a:t> The response function VRM was designed and implemented around a simplified point source problem of a single heated cell as shown in Fig. 1:</a:t>
             </a:r>
           </a:p>
         </p:txBody>
@@ -6739,7 +6732,7 @@
         <p:spPr>
           <a:xfrm>
             <a:off x="21515202" y="20421453"/>
-            <a:ext cx="5555990" cy="3570208"/>
+            <a:ext cx="5555990" cy="4308872"/>
           </a:xfrm>
           <a:prstGeom prst="rect">
             <a:avLst/>
@@ -6770,13 +6763,13 @@
               <a:rPr lang="en-US" sz="2400" dirty="0">
                 <a:latin typeface="Times" pitchFamily="2" charset="0"/>
               </a:rPr>
-              <a:t>A graph showing the average values of the flux for a point source problem as well as the accompanying variance as a function of the number of particles used in the simulation. This shows that our method has far less variance for fewer simulated particles, which implies that it is a more reliable method under these conditions. </a:t>
-            </a:r>
-          </a:p>
-        </p:txBody>
-      </p:sp>
-      <mc:AlternateContent xmlns:mc="http://schemas.openxmlformats.org/markup-compatibility/2006">
-        <mc:Choice xmlns:a14="http://schemas.microsoft.com/office/drawing/2010/main" Requires="a14">
+              <a:t>A graph showing the average values of the flux for a point source problem as well as the variance as a function of the number of particles used in the simulation. This shows that our method has far less variance for fewer simulated particles, which implies that it is a more reliable method under these conditions. Data point 2 appears to be an anomaly – likely resulting from statistics or a minor bug in our code.</a:t>
+            </a:r>
+          </a:p>
+        </p:txBody>
+      </p:sp>
+      <mc:AlternateContent xmlns:mc="http://schemas.openxmlformats.org/markup-compatibility/2006" xmlns:a14="http://schemas.microsoft.com/office/drawing/2010/main">
+        <mc:Choice Requires="a14">
           <p:sp>
             <p:nvSpPr>
               <p:cNvPr id="31" name="TextBox 30">
@@ -6946,7 +6939,7 @@
             </p:txBody>
           </p:sp>
         </mc:Choice>
-        <mc:Fallback>
+        <mc:Fallback xmlns="">
           <p:sp>
             <p:nvSpPr>
               <p:cNvPr id="31" name="TextBox 30">
@@ -6991,8 +6984,8 @@
           </p:sp>
         </mc:Fallback>
       </mc:AlternateContent>
-      <mc:AlternateContent xmlns:mc="http://schemas.openxmlformats.org/markup-compatibility/2006">
-        <mc:Choice xmlns:a14="http://schemas.microsoft.com/office/drawing/2010/main" Requires="a14">
+      <mc:AlternateContent xmlns:mc="http://schemas.openxmlformats.org/markup-compatibility/2006" xmlns:a14="http://schemas.microsoft.com/office/drawing/2010/main">
+        <mc:Choice Requires="a14">
           <p:sp>
             <p:nvSpPr>
               <p:cNvPr id="34" name="Rectangle 33">
@@ -7311,7 +7304,7 @@
             </p:txBody>
           </p:sp>
         </mc:Choice>
-        <mc:Fallback>
+        <mc:Fallback xmlns="">
           <p:sp>
             <p:nvSpPr>
               <p:cNvPr id="34" name="Rectangle 33">
@@ -7386,8 +7379,8 @@
           </a:prstGeom>
         </p:spPr>
       </p:pic>
-      <mc:AlternateContent xmlns:mc="http://schemas.openxmlformats.org/markup-compatibility/2006">
-        <mc:Choice xmlns:a14="http://schemas.microsoft.com/office/drawing/2010/main" Requires="a14">
+      <mc:AlternateContent xmlns:mc="http://schemas.openxmlformats.org/markup-compatibility/2006" xmlns:a14="http://schemas.microsoft.com/office/drawing/2010/main">
+        <mc:Choice Requires="a14">
           <p:sp>
             <p:nvSpPr>
               <p:cNvPr id="30" name="TextBox 29">
@@ -7403,7 +7396,7 @@
             <p:spPr>
               <a:xfrm>
                 <a:off x="34730488" y="4342394"/>
-                <a:ext cx="5439241" cy="6155531"/>
+                <a:ext cx="5439241" cy="5416868"/>
               </a:xfrm>
               <a:prstGeom prst="rect">
                 <a:avLst/>
@@ -7504,7 +7497,48 @@
                   <a:rPr lang="en-US" sz="2400" dirty="0">
                     <a:latin typeface="Times" pitchFamily="2" charset="0"/>
                   </a:rPr>
-                  <a:t> values generated by the response function method (right-hand side). The smearing artifacts show a limitation of the direction-independent </a:t>
+                  <a:t> values generated by the response function method (right-hand side). </a:t>
+                </a:r>
+                <a14:m>
+                  <m:oMath xmlns:m="http://schemas.openxmlformats.org/officeDocument/2006/math">
+                    <m:sSub>
+                      <m:sSubPr>
+                        <m:ctrlPr>
+                          <a:rPr lang="en-US" sz="2400" i="1">
+                            <a:latin typeface="Cambria Math" panose="02040503050406030204" pitchFamily="18" charset="0"/>
+                          </a:rPr>
+                        </m:ctrlPr>
+                      </m:sSubPr>
+                      <m:e>
+                        <m:r>
+                          <a:rPr lang="en-US" sz="2400" i="1">
+                            <a:latin typeface="Cambria Math" panose="02040503050406030204" pitchFamily="18" charset="0"/>
+                          </a:rPr>
+                          <m:t>𝜎</m:t>
+                        </m:r>
+                      </m:e>
+                      <m:sub>
+                        <m:r>
+                          <a:rPr lang="en-US" sz="2400" i="1">
+                            <a:latin typeface="Cambria Math" panose="02040503050406030204" pitchFamily="18" charset="0"/>
+                          </a:rPr>
+                          <m:t>𝑟</m:t>
+                        </m:r>
+                      </m:sub>
+                    </m:sSub>
+                    <m:r>
+                      <a:rPr lang="en-US" sz="2400" i="1">
+                        <a:latin typeface="Cambria Math" panose="02040503050406030204" pitchFamily="18" charset="0"/>
+                      </a:rPr>
+                      <m:t> </m:t>
+                    </m:r>
+                  </m:oMath>
+                </a14:m>
+                <a:r>
+                  <a:rPr lang="en-US" sz="2400" dirty="0">
+                    <a:latin typeface="Times" pitchFamily="2" charset="0"/>
+                  </a:rPr>
+                  <a:t>represents the average opacity between the cell and every possible tally location. The smearing artifacts show a limitation of the direction-independent </a:t>
                 </a:r>
                 <a14:m>
                   <m:oMath xmlns:m="http://schemas.openxmlformats.org/officeDocument/2006/math">
@@ -7574,48 +7608,13 @@
                   <a:rPr lang="en-US" sz="2400" dirty="0">
                     <a:latin typeface="Times" pitchFamily="2" charset="0"/>
                   </a:rPr>
-                  <a:t> value. This is such in our case where the problem is surrounded by a void, however, once particles enter the void, they still contribute to the cells </a:t>
-                </a:r>
-                <a14:m>
-                  <m:oMath xmlns:m="http://schemas.openxmlformats.org/officeDocument/2006/math">
-                    <m:sSub>
-                      <m:sSubPr>
-                        <m:ctrlPr>
-                          <a:rPr lang="en-US" sz="2400" i="1">
-                            <a:latin typeface="Cambria Math" panose="02040503050406030204" pitchFamily="18" charset="0"/>
-                          </a:rPr>
-                        </m:ctrlPr>
-                      </m:sSubPr>
-                      <m:e>
-                        <m:r>
-                          <a:rPr lang="en-US" sz="2400" i="1">
-                            <a:latin typeface="Cambria Math" panose="02040503050406030204" pitchFamily="18" charset="0"/>
-                          </a:rPr>
-                          <m:t>𝜎</m:t>
-                        </m:r>
-                      </m:e>
-                      <m:sub>
-                        <m:r>
-                          <a:rPr lang="en-US" sz="2400" i="1">
-                            <a:latin typeface="Cambria Math" panose="02040503050406030204" pitchFamily="18" charset="0"/>
-                          </a:rPr>
-                          <m:t>𝑟</m:t>
-                        </m:r>
-                      </m:sub>
-                    </m:sSub>
-                  </m:oMath>
-                </a14:m>
-                <a:r>
-                  <a:rPr lang="en-US" sz="2400" dirty="0">
-                    <a:latin typeface="Times" pitchFamily="2" charset="0"/>
-                  </a:rPr>
-                  <a:t> value.</a:t>
+                  <a:t> value. </a:t>
                 </a:r>
               </a:p>
             </p:txBody>
           </p:sp>
         </mc:Choice>
-        <mc:Fallback>
+        <mc:Fallback xmlns="">
           <p:sp>
             <p:nvSpPr>
               <p:cNvPr id="30" name="TextBox 29">
@@ -7633,7 +7632,7 @@
             <p:spPr>
               <a:xfrm>
                 <a:off x="34730488" y="4342394"/>
-                <a:ext cx="5439241" cy="6155531"/>
+                <a:ext cx="5439241" cy="5416868"/>
               </a:xfrm>
               <a:prstGeom prst="rect">
                 <a:avLst/>
@@ -7641,7 +7640,7 @@
               <a:blipFill>
                 <a:blip r:embed="rId9"/>
                 <a:stretch>
-                  <a:fillRect l="-1632" t="-823" r="-1632" b="-1235"/>
+                  <a:fillRect l="-1632" t="-937" r="-1632" b="-1639"/>
                 </a:stretch>
               </a:blipFill>
             </p:spPr>
@@ -7736,7 +7735,19 @@
               <a:rPr lang="en-US" sz="2400" dirty="0">
                 <a:latin typeface="Times" pitchFamily="2" charset="0"/>
               </a:rPr>
-              <a:t>A graph demonstrating the variance of the regular tally, and response function tally for the simplified supernova simulation from Fig. 5 as a function of the simulation time. Ten independent simulations were run with unique random number seeds. The general trends indicate that the response function method has a significantly lower variance at any given time step compared to the regular tally method</a:t>
+              <a:t>A graph demonstrating the variance of the regular tally, and response function tally for the simplified supernova simulation from Fig. 5 as a function of the simulation time. Twenty </a:t>
+            </a:r>
+            <a:r>
+              <a:rPr lang="en-US" sz="2400" dirty="0" err="1">
+                <a:latin typeface="Times" pitchFamily="2" charset="0"/>
+              </a:rPr>
+              <a:t>indep</a:t>
+            </a:r>
+            <a:r>
+              <a:rPr lang="en-US" sz="2400" dirty="0">
+                <a:latin typeface="Times" pitchFamily="2" charset="0"/>
+              </a:rPr>
+              <a:t>. simulations were run with unique random number seeds. The general trends indicate that the response function method has a significantly lower variance at any given time step compared to the regular tally method.</a:t>
             </a:r>
           </a:p>
         </p:txBody>
@@ -7773,10 +7784,10 @@
       </p:pic>
       <p:pic>
         <p:nvPicPr>
-          <p:cNvPr id="38" name="Picture 37">
+          <p:cNvPr id="44" name="Picture 43">
             <a:extLst>
               <a:ext uri="{FF2B5EF4-FFF2-40B4-BE49-F238E27FC236}">
-                <a16:creationId xmlns:a16="http://schemas.microsoft.com/office/drawing/2014/main" id="{93E839C1-B844-D441-9E4E-20E35C750C0D}"/>
+                <a16:creationId xmlns:a16="http://schemas.microsoft.com/office/drawing/2014/main" id="{8B072329-C569-2642-AAA6-75D9CCC8FA58}"/>
               </a:ext>
             </a:extLst>
           </p:cNvPr>
@@ -7793,67 +7804,7 @@
         </p:blipFill>
         <p:spPr>
           <a:xfrm>
-            <a:off x="14342486" y="24900256"/>
-            <a:ext cx="8045912" cy="5331873"/>
-          </a:xfrm>
-          <a:prstGeom prst="rect">
-            <a:avLst/>
-          </a:prstGeom>
-        </p:spPr>
-      </p:pic>
-      <p:pic>
-        <p:nvPicPr>
-          <p:cNvPr id="42" name="Picture 41">
-            <a:extLst>
-              <a:ext uri="{FF2B5EF4-FFF2-40B4-BE49-F238E27FC236}">
-                <a16:creationId xmlns:a16="http://schemas.microsoft.com/office/drawing/2014/main" id="{7BB58035-7436-0E4B-BBE0-15D02A96427B}"/>
-              </a:ext>
-            </a:extLst>
-          </p:cNvPr>
-          <p:cNvPicPr>
-            <a:picLocks noChangeAspect="1"/>
-          </p:cNvPicPr>
-          <p:nvPr/>
-        </p:nvPicPr>
-        <p:blipFill>
-          <a:blip r:embed="rId13"/>
-          <a:stretch>
-            <a:fillRect/>
-          </a:stretch>
-        </p:blipFill>
-        <p:spPr>
-          <a:xfrm>
-            <a:off x="27545086" y="10734701"/>
-            <a:ext cx="7959162" cy="5114998"/>
-          </a:xfrm>
-          <a:prstGeom prst="rect">
-            <a:avLst/>
-          </a:prstGeom>
-        </p:spPr>
-      </p:pic>
-      <p:pic>
-        <p:nvPicPr>
-          <p:cNvPr id="44" name="Picture 43">
-            <a:extLst>
-              <a:ext uri="{FF2B5EF4-FFF2-40B4-BE49-F238E27FC236}">
-                <a16:creationId xmlns:a16="http://schemas.microsoft.com/office/drawing/2014/main" id="{8B072329-C569-2642-AAA6-75D9CCC8FA58}"/>
-              </a:ext>
-            </a:extLst>
-          </p:cNvPr>
-          <p:cNvPicPr>
-            <a:picLocks noChangeAspect="1"/>
-          </p:cNvPicPr>
-          <p:nvPr/>
-        </p:nvPicPr>
-        <p:blipFill>
-          <a:blip r:embed="rId14"/>
-          <a:stretch>
-            <a:fillRect/>
-          </a:stretch>
-        </p:blipFill>
-        <p:spPr>
-          <a:xfrm>
-            <a:off x="27631386" y="16022898"/>
+            <a:off x="27631386" y="15794298"/>
             <a:ext cx="5750335" cy="5114998"/>
           </a:xfrm>
           <a:prstGeom prst="rect">
@@ -7876,14 +7827,14 @@
           <p:nvPr/>
         </p:nvPicPr>
         <p:blipFill>
-          <a:blip r:embed="rId15"/>
+          <a:blip r:embed="rId13"/>
           <a:stretch>
             <a:fillRect/>
           </a:stretch>
         </p:blipFill>
         <p:spPr>
           <a:xfrm>
-            <a:off x="33584638" y="16021324"/>
+            <a:off x="33584638" y="15792724"/>
             <a:ext cx="5750335" cy="5150672"/>
           </a:xfrm>
           <a:prstGeom prst="rect">
@@ -7905,7 +7856,7 @@
         </p:nvSpPr>
         <p:spPr>
           <a:xfrm>
-            <a:off x="27422326" y="27991568"/>
+            <a:off x="27422326" y="28867868"/>
             <a:ext cx="12798202" cy="666573"/>
           </a:xfrm>
           <a:prstGeom prst="rect">
@@ -8057,7 +8008,7 @@
         </p:nvSpPr>
         <p:spPr>
           <a:xfrm>
-            <a:off x="27389021" y="29049528"/>
+            <a:off x="27389021" y="29582928"/>
             <a:ext cx="12798202" cy="1077218"/>
           </a:xfrm>
           <a:prstGeom prst="rect">
@@ -8146,8 +8097,8 @@
         </p:nvSpPr>
         <p:spPr>
           <a:xfrm>
-            <a:off x="27545086" y="21004676"/>
-            <a:ext cx="12487590" cy="1723549"/>
+            <a:off x="27545086" y="20814176"/>
+            <a:ext cx="12487590" cy="2092881"/>
           </a:xfrm>
           <a:prstGeom prst="rect">
             <a:avLst/>
@@ -8178,7 +8129,7 @@
               <a:rPr lang="en-US" sz="2400" dirty="0">
                 <a:latin typeface="Times" pitchFamily="2" charset="0"/>
               </a:rPr>
-              <a:t>These plots show the electron temperature (left) and the radiative temperature (right) at the end of the simulation shown in Figs. 4, 5 &amp; 6. Overheating in the left plot likely results from small corner cells. The smearing in the right plot is an artifact stemming from the same reasons in Fig. 5.</a:t>
+              <a:t>These plots show the electron temperature (left) and the radiative temperature (right) at the end of the simulation shown in Figs. 4, 5 &amp; 6. Overheating in the left plot likely results from small corner cells. The noise in the radiation field results from a limited number of photons, the optical thickness of the material, and the coarse mesh granularity of the void region.</a:t>
             </a:r>
           </a:p>
         </p:txBody>
@@ -8197,8 +8148,8 @@
         </p:nvSpPr>
         <p:spPr>
           <a:xfrm>
-            <a:off x="27367249" y="23759065"/>
-            <a:ext cx="12798202" cy="4031873"/>
+            <a:off x="27367249" y="23720965"/>
+            <a:ext cx="12798202" cy="5016758"/>
           </a:xfrm>
           <a:prstGeom prst="rect">
             <a:avLst/>
@@ -8216,11 +8167,91 @@
                 <a:latin typeface="Times"/>
                 <a:cs typeface="Times"/>
               </a:rPr>
-              <a:t> Our investigation into the use of a response function-based variance reduction method for use in simulations modeling supernova interactions with its circumstellar medium has shown a notable improvement in variance over standard methods. Furthermore, while the geometry of the tally surface does play an impact on the calculated flux values, we would expect that with an appropriate geometry for a given problem, the response function method will match the ‘true’ flux with a statistically significant reduction in the answer variance.</a:t>
-            </a:r>
-          </a:p>
-        </p:txBody>
-      </p:sp>
+              <a:t>     Our investigation into the use of a response function-based variance reduction method for use in simulations modeling supernova interactions with its circumstellar medium has shown a notable improvement in variance over standard methods. </a:t>
+            </a:r>
+          </a:p>
+          <a:p>
+            <a:pPr algn="just"/>
+            <a:r>
+              <a:rPr lang="en-US" sz="3200" dirty="0">
+                <a:latin typeface="Times"/>
+                <a:cs typeface="Times"/>
+              </a:rPr>
+              <a:t>    The lack or directionality in the response function likely causes the method to under-predict the flux for a spherical tally. We do expect that the method will preform significantly better for other tally geometries, i.e. planes, as the directionality is more obviously built into the response. </a:t>
+            </a:r>
+          </a:p>
+          <a:p>
+            <a:pPr algn="just"/>
+            <a:r>
+              <a:rPr lang="en-US" sz="3200" dirty="0">
+                <a:latin typeface="Times"/>
+                <a:cs typeface="Times"/>
+              </a:rPr>
+              <a:t>     Future work will be looking at potentially improving the directionality of the response function and its performance for other tally geometries.</a:t>
+            </a:r>
+          </a:p>
+        </p:txBody>
+      </p:sp>
+      <p:pic>
+        <p:nvPicPr>
+          <p:cNvPr id="21" name="Picture 20">
+            <a:extLst>
+              <a:ext uri="{FF2B5EF4-FFF2-40B4-BE49-F238E27FC236}">
+                <a16:creationId xmlns:a16="http://schemas.microsoft.com/office/drawing/2014/main" id="{5EFE80E5-1529-DF4A-B3AD-9529937D1EB7}"/>
+              </a:ext>
+            </a:extLst>
+          </p:cNvPr>
+          <p:cNvPicPr>
+            <a:picLocks noChangeAspect="1"/>
+          </p:cNvPicPr>
+          <p:nvPr/>
+        </p:nvPicPr>
+        <p:blipFill>
+          <a:blip r:embed="rId14"/>
+          <a:stretch>
+            <a:fillRect/>
+          </a:stretch>
+        </p:blipFill>
+        <p:spPr>
+          <a:xfrm>
+            <a:off x="14311759" y="24849503"/>
+            <a:ext cx="8299367" cy="5554612"/>
+          </a:xfrm>
+          <a:prstGeom prst="rect">
+            <a:avLst/>
+          </a:prstGeom>
+        </p:spPr>
+      </p:pic>
+      <p:pic>
+        <p:nvPicPr>
+          <p:cNvPr id="25" name="Picture 24">
+            <a:extLst>
+              <a:ext uri="{FF2B5EF4-FFF2-40B4-BE49-F238E27FC236}">
+                <a16:creationId xmlns:a16="http://schemas.microsoft.com/office/drawing/2014/main" id="{E78F5FBF-2EDA-5340-88A6-F578D6F42C13}"/>
+              </a:ext>
+            </a:extLst>
+          </p:cNvPr>
+          <p:cNvPicPr>
+            <a:picLocks noChangeAspect="1"/>
+          </p:cNvPicPr>
+          <p:nvPr/>
+        </p:nvPicPr>
+        <p:blipFill>
+          <a:blip r:embed="rId15"/>
+          <a:stretch>
+            <a:fillRect/>
+          </a:stretch>
+        </p:blipFill>
+        <p:spPr>
+          <a:xfrm>
+            <a:off x="27435135" y="10749970"/>
+            <a:ext cx="8138363" cy="4968684"/>
+          </a:xfrm>
+          <a:prstGeom prst="rect">
+            <a:avLst/>
+          </a:prstGeom>
+        </p:spPr>
+      </p:pic>
     </p:spTree>
     <p:extLst>
       <p:ext uri="{BB962C8B-B14F-4D97-AF65-F5344CB8AC3E}">

</xml_diff>

<commit_message>
Updated the figures, Updated the report with suggested changes
</commit_message>
<xml_diff>
--- a/Poster and Presentation/Variance_Reduction_Poster.pptx
+++ b/Poster and Presentation/Variance_Reduction_Poster.pptx
@@ -7703,8 +7703,8 @@
         </p:nvSpPr>
         <p:spPr>
           <a:xfrm>
-            <a:off x="22664285" y="24942472"/>
-            <a:ext cx="4310172" cy="5416868"/>
+            <a:off x="22521031" y="24942472"/>
+            <a:ext cx="4453426" cy="5416868"/>
           </a:xfrm>
           <a:prstGeom prst="rect">
             <a:avLst/>
@@ -7774,7 +7774,7 @@
         </p:blipFill>
         <p:spPr>
           <a:xfrm>
-            <a:off x="14342486" y="20387313"/>
+            <a:off x="14296766" y="20387313"/>
             <a:ext cx="7037057" cy="4353471"/>
           </a:xfrm>
           <a:prstGeom prst="rect">
@@ -8194,10 +8194,10 @@
       </p:sp>
       <p:pic>
         <p:nvPicPr>
-          <p:cNvPr id="21" name="Picture 20">
+          <p:cNvPr id="25" name="Picture 24">
             <a:extLst>
               <a:ext uri="{FF2B5EF4-FFF2-40B4-BE49-F238E27FC236}">
-                <a16:creationId xmlns:a16="http://schemas.microsoft.com/office/drawing/2014/main" id="{5EFE80E5-1529-DF4A-B3AD-9529937D1EB7}"/>
+                <a16:creationId xmlns:a16="http://schemas.microsoft.com/office/drawing/2014/main" id="{E78F5FBF-2EDA-5340-88A6-F578D6F42C13}"/>
               </a:ext>
             </a:extLst>
           </p:cNvPr>
@@ -8214,8 +8214,8 @@
         </p:blipFill>
         <p:spPr>
           <a:xfrm>
-            <a:off x="14311759" y="24849503"/>
-            <a:ext cx="8299367" cy="5554612"/>
+            <a:off x="27435135" y="10749970"/>
+            <a:ext cx="8138363" cy="4968684"/>
           </a:xfrm>
           <a:prstGeom prst="rect">
             <a:avLst/>
@@ -8224,10 +8224,10 @@
       </p:pic>
       <p:pic>
         <p:nvPicPr>
-          <p:cNvPr id="25" name="Picture 24">
+          <p:cNvPr id="16" name="Picture 15">
             <a:extLst>
               <a:ext uri="{FF2B5EF4-FFF2-40B4-BE49-F238E27FC236}">
-                <a16:creationId xmlns:a16="http://schemas.microsoft.com/office/drawing/2014/main" id="{E78F5FBF-2EDA-5340-88A6-F578D6F42C13}"/>
+                <a16:creationId xmlns:a16="http://schemas.microsoft.com/office/drawing/2014/main" id="{F699B24F-48BF-074C-B359-E684223D4678}"/>
               </a:ext>
             </a:extLst>
           </p:cNvPr>
@@ -8244,8 +8244,8 @@
         </p:blipFill>
         <p:spPr>
           <a:xfrm>
-            <a:off x="27435135" y="10749970"/>
-            <a:ext cx="8138363" cy="4968684"/>
+            <a:off x="14283214" y="24799796"/>
+            <a:ext cx="8154755" cy="5559543"/>
           </a:xfrm>
           <a:prstGeom prst="rect">
             <a:avLst/>

</xml_diff>

<commit_message>
Updated the quick look presentation
</commit_message>
<xml_diff>
--- a/Poster and Presentation/Variance_Reduction_Poster.pptx
+++ b/Poster and Presentation/Variance_Reduction_Poster.pptx
@@ -3794,14 +3794,14 @@
           <a:effectLst/>
           <a:extLst>
             <a:ext uri="{909E8E84-426E-40dd-AFC4-6F175D3DCCD1}">
-              <a14:hiddenFill xmlns="" xmlns:a14="http://schemas.microsoft.com/office/drawing/2010/main">
+              <a14:hiddenFill xmlns:a14="http://schemas.microsoft.com/office/drawing/2010/main" xmlns="">
                 <a:solidFill>
                   <a:schemeClr val="accent1"/>
                 </a:solidFill>
               </a14:hiddenFill>
             </a:ext>
             <a:ext uri="{91240B29-F687-4f45-9708-019B960494DF}">
-              <a14:hiddenLine xmlns="" xmlns:a14="http://schemas.microsoft.com/office/drawing/2010/main" w="9525">
+              <a14:hiddenLine xmlns:a14="http://schemas.microsoft.com/office/drawing/2010/main" xmlns="" w="9525">
                 <a:solidFill>
                   <a:schemeClr val="tx1"/>
                 </a:solidFill>
@@ -3811,7 +3811,7 @@
               </a14:hiddenLine>
             </a:ext>
             <a:ext uri="{AF507438-7753-43e0-B8FC-AC1667EBCBE1}">
-              <a14:hiddenEffects xmlns="" xmlns:a14="http://schemas.microsoft.com/office/drawing/2010/main">
+              <a14:hiddenEffects xmlns:a14="http://schemas.microsoft.com/office/drawing/2010/main" xmlns="">
                 <a:effectLst>
                   <a:outerShdw dist="35921" dir="2700000" algn="ctr" rotWithShape="0">
                     <a:schemeClr val="bg2"/>
@@ -3934,14 +3934,14 @@
           <a:effectLst/>
           <a:extLst>
             <a:ext uri="{909E8E84-426E-40dd-AFC4-6F175D3DCCD1}">
-              <a14:hiddenFill xmlns="" xmlns:a14="http://schemas.microsoft.com/office/drawing/2010/main">
+              <a14:hiddenFill xmlns:a14="http://schemas.microsoft.com/office/drawing/2010/main" xmlns="">
                 <a:solidFill>
                   <a:schemeClr val="accent1"/>
                 </a:solidFill>
               </a14:hiddenFill>
             </a:ext>
             <a:ext uri="{91240B29-F687-4f45-9708-019B960494DF}">
-              <a14:hiddenLine xmlns="" xmlns:a14="http://schemas.microsoft.com/office/drawing/2010/main" w="9525">
+              <a14:hiddenLine xmlns:a14="http://schemas.microsoft.com/office/drawing/2010/main" xmlns="" w="9525">
                 <a:solidFill>
                   <a:schemeClr val="tx1"/>
                 </a:solidFill>
@@ -3951,7 +3951,7 @@
               </a14:hiddenLine>
             </a:ext>
             <a:ext uri="{AF507438-7753-43e0-B8FC-AC1667EBCBE1}">
-              <a14:hiddenEffects xmlns="" xmlns:a14="http://schemas.microsoft.com/office/drawing/2010/main">
+              <a14:hiddenEffects xmlns:a14="http://schemas.microsoft.com/office/drawing/2010/main" xmlns="">
                 <a:effectLst>
                   <a:outerShdw dist="35921" dir="2700000" algn="ctr" rotWithShape="0">
                     <a:schemeClr val="bg2"/>
@@ -7681,7 +7681,7 @@
         </p:blipFill>
         <p:spPr>
           <a:xfrm>
-            <a:off x="14257019" y="6049934"/>
+            <a:off x="14257019" y="6020437"/>
             <a:ext cx="5189756" cy="5137014"/>
           </a:xfrm>
           <a:prstGeom prst="rect">

</xml_diff>

<commit_message>
Updated figures and article with results
</commit_message>
<xml_diff>
--- a/Poster and Presentation/Variance_Reduction_Poster.pptx
+++ b/Poster and Presentation/Variance_Reduction_Poster.pptx
@@ -208,7 +208,7 @@
           <a:p>
             <a:fld id="{C64D7CA3-7008-7349-8B55-6C7D24D241FF}" type="datetimeFigureOut">
               <a:rPr lang="en-US" smtClean="0"/>
-              <a:t>8/6/19</a:t>
+              <a:t>8/8/19</a:t>
             </a:fld>
             <a:endParaRPr lang="en-US"/>
           </a:p>
@@ -738,7 +738,7 @@
           <a:p>
             <a:fld id="{2FD8D12E-95C4-274C-8538-6990C022EAF5}" type="datetimeFigureOut">
               <a:rPr lang="en-US" smtClean="0"/>
-              <a:t>8/6/19</a:t>
+              <a:t>8/8/19</a:t>
             </a:fld>
             <a:endParaRPr lang="en-US"/>
           </a:p>
@@ -906,7 +906,7 @@
           <a:p>
             <a:fld id="{2FD8D12E-95C4-274C-8538-6990C022EAF5}" type="datetimeFigureOut">
               <a:rPr lang="en-US" smtClean="0"/>
-              <a:t>8/6/19</a:t>
+              <a:t>8/8/19</a:t>
             </a:fld>
             <a:endParaRPr lang="en-US"/>
           </a:p>
@@ -1084,7 +1084,7 @@
           <a:p>
             <a:fld id="{2FD8D12E-95C4-274C-8538-6990C022EAF5}" type="datetimeFigureOut">
               <a:rPr lang="en-US" smtClean="0"/>
-              <a:t>8/6/19</a:t>
+              <a:t>8/8/19</a:t>
             </a:fld>
             <a:endParaRPr lang="en-US"/>
           </a:p>
@@ -1252,7 +1252,7 @@
           <a:p>
             <a:fld id="{2FD8D12E-95C4-274C-8538-6990C022EAF5}" type="datetimeFigureOut">
               <a:rPr lang="en-US" smtClean="0"/>
-              <a:t>8/6/19</a:t>
+              <a:t>8/8/19</a:t>
             </a:fld>
             <a:endParaRPr lang="en-US"/>
           </a:p>
@@ -1497,7 +1497,7 @@
           <a:p>
             <a:fld id="{2FD8D12E-95C4-274C-8538-6990C022EAF5}" type="datetimeFigureOut">
               <a:rPr lang="en-US" smtClean="0"/>
-              <a:t>8/6/19</a:t>
+              <a:t>8/8/19</a:t>
             </a:fld>
             <a:endParaRPr lang="en-US"/>
           </a:p>
@@ -1782,7 +1782,7 @@
           <a:p>
             <a:fld id="{2FD8D12E-95C4-274C-8538-6990C022EAF5}" type="datetimeFigureOut">
               <a:rPr lang="en-US" smtClean="0"/>
-              <a:t>8/6/19</a:t>
+              <a:t>8/8/19</a:t>
             </a:fld>
             <a:endParaRPr lang="en-US"/>
           </a:p>
@@ -2201,7 +2201,7 @@
           <a:p>
             <a:fld id="{2FD8D12E-95C4-274C-8538-6990C022EAF5}" type="datetimeFigureOut">
               <a:rPr lang="en-US" smtClean="0"/>
-              <a:t>8/6/19</a:t>
+              <a:t>8/8/19</a:t>
             </a:fld>
             <a:endParaRPr lang="en-US"/>
           </a:p>
@@ -2318,7 +2318,7 @@
           <a:p>
             <a:fld id="{2FD8D12E-95C4-274C-8538-6990C022EAF5}" type="datetimeFigureOut">
               <a:rPr lang="en-US" smtClean="0"/>
-              <a:t>8/6/19</a:t>
+              <a:t>8/8/19</a:t>
             </a:fld>
             <a:endParaRPr lang="en-US"/>
           </a:p>
@@ -2413,7 +2413,7 @@
           <a:p>
             <a:fld id="{2FD8D12E-95C4-274C-8538-6990C022EAF5}" type="datetimeFigureOut">
               <a:rPr lang="en-US" smtClean="0"/>
-              <a:t>8/6/19</a:t>
+              <a:t>8/8/19</a:t>
             </a:fld>
             <a:endParaRPr lang="en-US"/>
           </a:p>
@@ -2688,7 +2688,7 @@
           <a:p>
             <a:fld id="{2FD8D12E-95C4-274C-8538-6990C022EAF5}" type="datetimeFigureOut">
               <a:rPr lang="en-US" smtClean="0"/>
-              <a:t>8/6/19</a:t>
+              <a:t>8/8/19</a:t>
             </a:fld>
             <a:endParaRPr lang="en-US"/>
           </a:p>
@@ -2940,7 +2940,7 @@
           <a:p>
             <a:fld id="{2FD8D12E-95C4-274C-8538-6990C022EAF5}" type="datetimeFigureOut">
               <a:rPr lang="en-US" smtClean="0"/>
-              <a:t>8/6/19</a:t>
+              <a:t>8/8/19</a:t>
             </a:fld>
             <a:endParaRPr lang="en-US"/>
           </a:p>
@@ -3151,7 +3151,7 @@
           <a:p>
             <a:fld id="{2FD8D12E-95C4-274C-8538-6990C022EAF5}" type="datetimeFigureOut">
               <a:rPr lang="en-US" smtClean="0"/>
-              <a:t>8/6/19</a:t>
+              <a:t>8/8/19</a:t>
             </a:fld>
             <a:endParaRPr lang="en-US"/>
           </a:p>
@@ -3794,14 +3794,14 @@
           <a:effectLst/>
           <a:extLst>
             <a:ext uri="{909E8E84-426E-40dd-AFC4-6F175D3DCCD1}">
-              <a14:hiddenFill xmlns:a14="http://schemas.microsoft.com/office/drawing/2010/main" xmlns="">
+              <a14:hiddenFill xmlns="" xmlns:a14="http://schemas.microsoft.com/office/drawing/2010/main">
                 <a:solidFill>
                   <a:schemeClr val="accent1"/>
                 </a:solidFill>
               </a14:hiddenFill>
             </a:ext>
             <a:ext uri="{91240B29-F687-4f45-9708-019B960494DF}">
-              <a14:hiddenLine xmlns:a14="http://schemas.microsoft.com/office/drawing/2010/main" xmlns="" w="9525">
+              <a14:hiddenLine xmlns="" xmlns:a14="http://schemas.microsoft.com/office/drawing/2010/main" w="9525">
                 <a:solidFill>
                   <a:schemeClr val="tx1"/>
                 </a:solidFill>
@@ -3811,7 +3811,7 @@
               </a14:hiddenLine>
             </a:ext>
             <a:ext uri="{AF507438-7753-43e0-B8FC-AC1667EBCBE1}">
-              <a14:hiddenEffects xmlns:a14="http://schemas.microsoft.com/office/drawing/2010/main" xmlns="">
+              <a14:hiddenEffects xmlns="" xmlns:a14="http://schemas.microsoft.com/office/drawing/2010/main">
                 <a:effectLst>
                   <a:outerShdw dist="35921" dir="2700000" algn="ctr" rotWithShape="0">
                     <a:schemeClr val="bg2"/>
@@ -3934,14 +3934,14 @@
           <a:effectLst/>
           <a:extLst>
             <a:ext uri="{909E8E84-426E-40dd-AFC4-6F175D3DCCD1}">
-              <a14:hiddenFill xmlns:a14="http://schemas.microsoft.com/office/drawing/2010/main" xmlns="">
+              <a14:hiddenFill xmlns="" xmlns:a14="http://schemas.microsoft.com/office/drawing/2010/main">
                 <a:solidFill>
                   <a:schemeClr val="accent1"/>
                 </a:solidFill>
               </a14:hiddenFill>
             </a:ext>
             <a:ext uri="{91240B29-F687-4f45-9708-019B960494DF}">
-              <a14:hiddenLine xmlns:a14="http://schemas.microsoft.com/office/drawing/2010/main" xmlns="" w="9525">
+              <a14:hiddenLine xmlns="" xmlns:a14="http://schemas.microsoft.com/office/drawing/2010/main" w="9525">
                 <a:solidFill>
                   <a:schemeClr val="tx1"/>
                 </a:solidFill>
@@ -3951,7 +3951,7 @@
               </a14:hiddenLine>
             </a:ext>
             <a:ext uri="{AF507438-7753-43e0-B8FC-AC1667EBCBE1}">
-              <a14:hiddenEffects xmlns:a14="http://schemas.microsoft.com/office/drawing/2010/main" xmlns="">
+              <a14:hiddenEffects xmlns="" xmlns:a14="http://schemas.microsoft.com/office/drawing/2010/main">
                 <a:effectLst>
                   <a:outerShdw dist="35921" dir="2700000" algn="ctr" rotWithShape="0">
                     <a:schemeClr val="bg2"/>

</xml_diff>